<commit_message>
update eoc demo ani
</commit_message>
<xml_diff>
--- a/.doc/EOCDemo_Ani.pptx
+++ b/.doc/EOCDemo_Ani.pptx
@@ -6,6 +6,7 @@
   </p:sldMasterIdLst>
   <p:sldIdLst>
     <p:sldId id="256" r:id="rId2"/>
+    <p:sldId id="257" r:id="rId3"/>
   </p:sldIdLst>
   <p:sldSz cx="9144000" cy="6858000" type="screen4x3"/>
   <p:notesSz cx="6858000" cy="9144000"/>
@@ -281,7 +282,7 @@
           <a:p>
             <a:fld id="{CFC56AD5-89D7-4DD6-BF59-1519A16FF68D}" type="datetimeFigureOut">
               <a:rPr lang="zh-CN" altLang="en-US" smtClean="0"/>
-              <a:t>2020/5/19</a:t>
+              <a:t>2020/5/20</a:t>
             </a:fld>
             <a:endParaRPr lang="zh-CN" altLang="en-US"/>
           </a:p>
@@ -461,7 +462,7 @@
           <a:p>
             <a:fld id="{CFC56AD5-89D7-4DD6-BF59-1519A16FF68D}" type="datetimeFigureOut">
               <a:rPr lang="zh-CN" altLang="en-US" smtClean="0"/>
-              <a:t>2020/5/19</a:t>
+              <a:t>2020/5/20</a:t>
             </a:fld>
             <a:endParaRPr lang="zh-CN" altLang="en-US"/>
           </a:p>
@@ -631,7 +632,7 @@
           <a:p>
             <a:fld id="{CFC56AD5-89D7-4DD6-BF59-1519A16FF68D}" type="datetimeFigureOut">
               <a:rPr lang="zh-CN" altLang="en-US" smtClean="0"/>
-              <a:t>2020/5/19</a:t>
+              <a:t>2020/5/20</a:t>
             </a:fld>
             <a:endParaRPr lang="zh-CN" altLang="en-US"/>
           </a:p>
@@ -875,7 +876,7 @@
           <a:p>
             <a:fld id="{CFC56AD5-89D7-4DD6-BF59-1519A16FF68D}" type="datetimeFigureOut">
               <a:rPr lang="zh-CN" altLang="en-US" smtClean="0"/>
-              <a:t>2020/5/19</a:t>
+              <a:t>2020/5/20</a:t>
             </a:fld>
             <a:endParaRPr lang="zh-CN" altLang="en-US"/>
           </a:p>
@@ -1107,7 +1108,7 @@
           <a:p>
             <a:fld id="{CFC56AD5-89D7-4DD6-BF59-1519A16FF68D}" type="datetimeFigureOut">
               <a:rPr lang="zh-CN" altLang="en-US" smtClean="0"/>
-              <a:t>2020/5/19</a:t>
+              <a:t>2020/5/20</a:t>
             </a:fld>
             <a:endParaRPr lang="zh-CN" altLang="en-US"/>
           </a:p>
@@ -1474,7 +1475,7 @@
           <a:p>
             <a:fld id="{CFC56AD5-89D7-4DD6-BF59-1519A16FF68D}" type="datetimeFigureOut">
               <a:rPr lang="zh-CN" altLang="en-US" smtClean="0"/>
-              <a:t>2020/5/19</a:t>
+              <a:t>2020/5/20</a:t>
             </a:fld>
             <a:endParaRPr lang="zh-CN" altLang="en-US"/>
           </a:p>
@@ -1592,7 +1593,7 @@
           <a:p>
             <a:fld id="{CFC56AD5-89D7-4DD6-BF59-1519A16FF68D}" type="datetimeFigureOut">
               <a:rPr lang="zh-CN" altLang="en-US" smtClean="0"/>
-              <a:t>2020/5/19</a:t>
+              <a:t>2020/5/20</a:t>
             </a:fld>
             <a:endParaRPr lang="zh-CN" altLang="en-US"/>
           </a:p>
@@ -1687,7 +1688,7 @@
           <a:p>
             <a:fld id="{CFC56AD5-89D7-4DD6-BF59-1519A16FF68D}" type="datetimeFigureOut">
               <a:rPr lang="zh-CN" altLang="en-US" smtClean="0"/>
-              <a:t>2020/5/19</a:t>
+              <a:t>2020/5/20</a:t>
             </a:fld>
             <a:endParaRPr lang="zh-CN" altLang="en-US"/>
           </a:p>
@@ -1964,7 +1965,7 @@
           <a:p>
             <a:fld id="{CFC56AD5-89D7-4DD6-BF59-1519A16FF68D}" type="datetimeFigureOut">
               <a:rPr lang="zh-CN" altLang="en-US" smtClean="0"/>
-              <a:t>2020/5/19</a:t>
+              <a:t>2020/5/20</a:t>
             </a:fld>
             <a:endParaRPr lang="zh-CN" altLang="en-US"/>
           </a:p>
@@ -2221,7 +2222,7 @@
           <a:p>
             <a:fld id="{CFC56AD5-89D7-4DD6-BF59-1519A16FF68D}" type="datetimeFigureOut">
               <a:rPr lang="zh-CN" altLang="en-US" smtClean="0"/>
-              <a:t>2020/5/19</a:t>
+              <a:t>2020/5/20</a:t>
             </a:fld>
             <a:endParaRPr lang="zh-CN" altLang="en-US"/>
           </a:p>
@@ -2434,7 +2435,7 @@
           <a:p>
             <a:fld id="{CFC56AD5-89D7-4DD6-BF59-1519A16FF68D}" type="datetimeFigureOut">
               <a:rPr lang="zh-CN" altLang="en-US" smtClean="0"/>
-              <a:t>2020/5/19</a:t>
+              <a:t>2020/5/20</a:t>
             </a:fld>
             <a:endParaRPr lang="zh-CN" altLang="en-US"/>
           </a:p>
@@ -2841,7 +2842,7 @@
       </p:grpSpPr>
       <p:sp>
         <p:nvSpPr>
-          <p:cNvPr id="8" name="对话气泡: 椭圆形 7">
+          <p:cNvPr id="8" name="对话气泡: 信件内容">
             <a:extLst>
               <a:ext uri="{FF2B5EF4-FFF2-40B4-BE49-F238E27FC236}">
                 <a16:creationId xmlns:a16="http://schemas.microsoft.com/office/drawing/2014/main" id="{B9F4B14F-35BC-4B34-B2A8-C6B647120EE1}"/>
@@ -2890,7 +2891,7 @@
       </p:sp>
       <p:sp>
         <p:nvSpPr>
-          <p:cNvPr id="9" name="文本框 8">
+          <p:cNvPr id="9" name="EOC信件内容">
             <a:extLst>
               <a:ext uri="{FF2B5EF4-FFF2-40B4-BE49-F238E27FC236}">
                 <a16:creationId xmlns:a16="http://schemas.microsoft.com/office/drawing/2014/main" id="{65B9CB1A-550F-4C7F-B483-8FB9E4818B33}"/>
@@ -2949,7 +2950,7 @@
       </p:sp>
       <p:pic>
         <p:nvPicPr>
-          <p:cNvPr id="12" name="图片 11">
+          <p:cNvPr id="12" name="绿色√">
             <a:extLst>
               <a:ext uri="{FF2B5EF4-FFF2-40B4-BE49-F238E27FC236}">
                 <a16:creationId xmlns:a16="http://schemas.microsoft.com/office/drawing/2014/main" id="{892B1F46-4967-495E-9193-A3DAEDD7A9DB}"/>
@@ -2979,7 +2980,7 @@
       </p:pic>
       <p:pic>
         <p:nvPicPr>
-          <p:cNvPr id="15" name="图片 14">
+          <p:cNvPr id="15" name="信封">
             <a:extLst>
               <a:ext uri="{FF2B5EF4-FFF2-40B4-BE49-F238E27FC236}">
                 <a16:creationId xmlns:a16="http://schemas.microsoft.com/office/drawing/2014/main" id="{E61C2E2C-FA34-4157-8627-EBAFCB4DA092}"/>
@@ -3014,7 +3015,7 @@
       </p:pic>
       <p:pic>
         <p:nvPicPr>
-          <p:cNvPr id="17" name="图片 16">
+          <p:cNvPr id="17" name="服务器笑脸">
             <a:extLst>
               <a:ext uri="{FF2B5EF4-FFF2-40B4-BE49-F238E27FC236}">
                 <a16:creationId xmlns:a16="http://schemas.microsoft.com/office/drawing/2014/main" id="{1CEA77B8-DF94-4BEF-9F21-74A77007FCDF}"/>
@@ -3044,7 +3045,7 @@
       </p:pic>
       <p:pic>
         <p:nvPicPr>
-          <p:cNvPr id="18" name="图片 17">
+          <p:cNvPr id="18" name="客户端笑脸">
             <a:extLst>
               <a:ext uri="{FF2B5EF4-FFF2-40B4-BE49-F238E27FC236}">
                 <a16:creationId xmlns:a16="http://schemas.microsoft.com/office/drawing/2014/main" id="{82784C61-C5CA-4275-8235-347579EAB9EE}"/>
@@ -3072,6 +3073,75 @@
           </a:prstGeom>
         </p:spPr>
       </p:pic>
+      <p:sp>
+        <p:nvSpPr>
+          <p:cNvPr id="2" name="文本框 1">
+            <a:extLst>
+              <a:ext uri="{FF2B5EF4-FFF2-40B4-BE49-F238E27FC236}">
+                <a16:creationId xmlns:a16="http://schemas.microsoft.com/office/drawing/2014/main" id="{43A73879-00BA-465F-B9CC-CF54C4EB33D1}"/>
+              </a:ext>
+            </a:extLst>
+          </p:cNvPr>
+          <p:cNvSpPr txBox="1"/>
+          <p:nvPr/>
+        </p:nvSpPr>
+        <p:spPr>
+          <a:xfrm>
+            <a:off x="729843" y="1471249"/>
+            <a:ext cx="2097049" cy="553998"/>
+          </a:xfrm>
+          <a:prstGeom prst="rect">
+            <a:avLst/>
+          </a:prstGeom>
+          <a:noFill/>
+        </p:spPr>
+        <p:txBody>
+          <a:bodyPr wrap="none" rtlCol="0">
+            <a:spAutoFit/>
+          </a:bodyPr>
+          <a:lstStyle/>
+          <a:p>
+            <a:r>
+              <a:rPr lang="en-US" altLang="zh-CN" sz="3000" dirty="0">
+                <a:solidFill>
+                  <a:srgbClr val="FF0000"/>
+                </a:solidFill>
+                <a:latin typeface="Times New Roman" panose="02020603050405020304" pitchFamily="18" charset="0"/>
+                <a:cs typeface="Times New Roman" panose="02020603050405020304" pitchFamily="18" charset="0"/>
+              </a:rPr>
+              <a:t>1</a:t>
+            </a:r>
+            <a:r>
+              <a:rPr lang="en-US" altLang="zh-CN" sz="3000" dirty="0">
+                <a:latin typeface="Times New Roman" panose="02020603050405020304" pitchFamily="18" charset="0"/>
+                <a:cs typeface="Times New Roman" panose="02020603050405020304" pitchFamily="18" charset="0"/>
+              </a:rPr>
+              <a:t> to </a:t>
+            </a:r>
+            <a:r>
+              <a:rPr lang="en-US" altLang="zh-CN" sz="3000" dirty="0">
+                <a:solidFill>
+                  <a:srgbClr val="FF0000"/>
+                </a:solidFill>
+                <a:latin typeface="Times New Roman" panose="02020603050405020304" pitchFamily="18" charset="0"/>
+                <a:cs typeface="Times New Roman" panose="02020603050405020304" pitchFamily="18" charset="0"/>
+              </a:rPr>
+              <a:t>1</a:t>
+            </a:r>
+            <a:r>
+              <a:rPr lang="en-US" altLang="zh-CN" sz="3000" dirty="0">
+                <a:latin typeface="Times New Roman" panose="02020603050405020304" pitchFamily="18" charset="0"/>
+                <a:cs typeface="Times New Roman" panose="02020603050405020304" pitchFamily="18" charset="0"/>
+              </a:rPr>
+              <a:t> POST</a:t>
+            </a:r>
+            <a:endParaRPr lang="zh-CN" altLang="en-US" sz="3000" dirty="0">
+              <a:latin typeface="Times New Roman" panose="02020603050405020304" pitchFamily="18" charset="0"/>
+              <a:cs typeface="Times New Roman" panose="02020603050405020304" pitchFamily="18" charset="0"/>
+            </a:endParaRPr>
+          </a:p>
+        </p:txBody>
+      </p:sp>
     </p:spTree>
     <p:extLst>
       <p:ext uri="{BB962C8B-B14F-4D97-AF65-F5344CB8AC3E}">
@@ -4348,6 +4418,3005 @@
       <p:bldP spid="9" grpId="0"/>
       <p:bldP spid="9" grpId="1"/>
       <p:bldP spid="9" grpId="2"/>
+    </p:bldLst>
+  </p:timing>
+</p:sld>
+</file>
+
+<file path=ppt/slides/slide2.xml><?xml version="1.0" encoding="utf-8"?>
+<p:sld xmlns:a="http://schemas.openxmlformats.org/drawingml/2006/main" xmlns:r="http://schemas.openxmlformats.org/officeDocument/2006/relationships" xmlns:p="http://schemas.openxmlformats.org/presentationml/2006/main">
+  <p:cSld>
+    <p:spTree>
+      <p:nvGrpSpPr>
+        <p:cNvPr id="1" name=""/>
+        <p:cNvGrpSpPr/>
+        <p:nvPr/>
+      </p:nvGrpSpPr>
+      <p:grpSpPr>
+        <a:xfrm>
+          <a:off x="0" y="0"/>
+          <a:ext cx="0" cy="0"/>
+          <a:chOff x="0" y="0"/>
+          <a:chExt cx="0" cy="0"/>
+        </a:xfrm>
+      </p:grpSpPr>
+      <p:sp>
+        <p:nvSpPr>
+          <p:cNvPr id="10" name="对话气泡: 信件内容">
+            <a:extLst>
+              <a:ext uri="{FF2B5EF4-FFF2-40B4-BE49-F238E27FC236}">
+                <a16:creationId xmlns:a16="http://schemas.microsoft.com/office/drawing/2014/main" id="{4C87AB54-4013-40DB-8F88-B73A5C221DAC}"/>
+              </a:ext>
+            </a:extLst>
+          </p:cNvPr>
+          <p:cNvSpPr/>
+          <p:nvPr/>
+        </p:nvSpPr>
+        <p:spPr>
+          <a:xfrm>
+            <a:off x="729843" y="2793535"/>
+            <a:ext cx="3003258" cy="1677798"/>
+          </a:xfrm>
+          <a:prstGeom prst="wedgeEllipseCallout">
+            <a:avLst/>
+          </a:prstGeom>
+          <a:solidFill>
+            <a:schemeClr val="bg1"/>
+          </a:solidFill>
+        </p:spPr>
+        <p:style>
+          <a:lnRef idx="2">
+            <a:schemeClr val="accent1">
+              <a:shade val="50000"/>
+            </a:schemeClr>
+          </a:lnRef>
+          <a:fillRef idx="1">
+            <a:schemeClr val="accent1"/>
+          </a:fillRef>
+          <a:effectRef idx="0">
+            <a:schemeClr val="accent1"/>
+          </a:effectRef>
+          <a:fontRef idx="minor">
+            <a:schemeClr val="lt1"/>
+          </a:fontRef>
+        </p:style>
+        <p:txBody>
+          <a:bodyPr rtlCol="0" anchor="ctr"/>
+          <a:lstStyle/>
+          <a:p>
+            <a:pPr algn="ctr"/>
+            <a:endParaRPr lang="zh-CN" altLang="en-US" dirty="0"/>
+          </a:p>
+        </p:txBody>
+      </p:sp>
+      <p:sp>
+        <p:nvSpPr>
+          <p:cNvPr id="11" name="EOC信件内容">
+            <a:extLst>
+              <a:ext uri="{FF2B5EF4-FFF2-40B4-BE49-F238E27FC236}">
+                <a16:creationId xmlns:a16="http://schemas.microsoft.com/office/drawing/2014/main" id="{4AA29530-555E-407D-9A1B-F960415A7874}"/>
+              </a:ext>
+            </a:extLst>
+          </p:cNvPr>
+          <p:cNvSpPr txBox="1"/>
+          <p:nvPr/>
+        </p:nvSpPr>
+        <p:spPr>
+          <a:xfrm>
+            <a:off x="1022291" y="3032269"/>
+            <a:ext cx="2762309" cy="1200329"/>
+          </a:xfrm>
+          <a:prstGeom prst="rect">
+            <a:avLst/>
+          </a:prstGeom>
+          <a:noFill/>
+        </p:spPr>
+        <p:txBody>
+          <a:bodyPr wrap="square" rtlCol="0">
+            <a:spAutoFit/>
+          </a:bodyPr>
+          <a:lstStyle/>
+          <a:p>
+            <a:r>
+              <a:rPr lang="en-US" altLang="zh-CN" dirty="0"/>
+              <a:t>Title: Hello!</a:t>
+            </a:r>
+          </a:p>
+          <a:p>
+            <a:r>
+              <a:rPr lang="en-US" altLang="zh-CN" dirty="0"/>
+              <a:t>Content: (any object)</a:t>
+            </a:r>
+          </a:p>
+          <a:p>
+            <a:r>
+              <a:rPr lang="en-US" altLang="zh-CN" dirty="0"/>
+              <a:t>Recipient: </a:t>
+            </a:r>
+            <a:r>
+              <a:rPr lang="en-US" altLang="zh-CN" dirty="0" err="1">
+                <a:solidFill>
+                  <a:srgbClr val="FF0000"/>
+                </a:solidFill>
+              </a:rPr>
+              <a:t>A,C@Tom,server</a:t>
+            </a:r>
+            <a:endParaRPr lang="en-US" altLang="zh-CN" dirty="0">
+              <a:solidFill>
+                <a:srgbClr val="FF0000"/>
+              </a:solidFill>
+            </a:endParaRPr>
+          </a:p>
+          <a:p>
+            <a:r>
+              <a:rPr lang="en-US" altLang="zh-CN" dirty="0"/>
+              <a:t>Mode: Post</a:t>
+            </a:r>
+            <a:endParaRPr lang="zh-CN" altLang="en-US" dirty="0"/>
+          </a:p>
+        </p:txBody>
+      </p:sp>
+      <p:pic>
+        <p:nvPicPr>
+          <p:cNvPr id="12" name="绿色√">
+            <a:extLst>
+              <a:ext uri="{FF2B5EF4-FFF2-40B4-BE49-F238E27FC236}">
+                <a16:creationId xmlns:a16="http://schemas.microsoft.com/office/drawing/2014/main" id="{59CF8D11-83CE-45BC-9854-AD891CACAE8D}"/>
+              </a:ext>
+            </a:extLst>
+          </p:cNvPr>
+          <p:cNvPicPr>
+            <a:picLocks noChangeAspect="1"/>
+          </p:cNvPicPr>
+          <p:nvPr/>
+        </p:nvPicPr>
+        <p:blipFill>
+          <a:blip r:embed="rId2"/>
+          <a:stretch>
+            <a:fillRect/>
+          </a:stretch>
+        </p:blipFill>
+        <p:spPr>
+          <a:xfrm>
+            <a:off x="2442718" y="3951828"/>
+            <a:ext cx="367594" cy="367594"/>
+          </a:xfrm>
+          <a:prstGeom prst="rect">
+            <a:avLst/>
+          </a:prstGeom>
+        </p:spPr>
+      </p:pic>
+      <p:pic>
+        <p:nvPicPr>
+          <p:cNvPr id="13" name="信封2EOCServer">
+            <a:extLst>
+              <a:ext uri="{FF2B5EF4-FFF2-40B4-BE49-F238E27FC236}">
+                <a16:creationId xmlns:a16="http://schemas.microsoft.com/office/drawing/2014/main" id="{361FE4DF-D5AD-4493-9722-1654EA8769C1}"/>
+              </a:ext>
+            </a:extLst>
+          </p:cNvPr>
+          <p:cNvPicPr>
+            <a:picLocks noChangeAspect="1"/>
+          </p:cNvPicPr>
+          <p:nvPr/>
+        </p:nvPicPr>
+        <p:blipFill>
+          <a:blip r:embed="rId3">
+            <a:extLst>
+              <a:ext uri="{28A0092B-C50C-407E-A947-70E740481C1C}">
+                <a14:useLocalDpi xmlns:a14="http://schemas.microsoft.com/office/drawing/2010/main" val="0"/>
+              </a:ext>
+            </a:extLst>
+          </a:blip>
+          <a:srcRect/>
+          <a:stretch/>
+        </p:blipFill>
+        <p:spPr>
+          <a:xfrm>
+            <a:off x="1364987" y="4743623"/>
+            <a:ext cx="533801" cy="373661"/>
+          </a:xfrm>
+          <a:prstGeom prst="rect">
+            <a:avLst/>
+          </a:prstGeom>
+        </p:spPr>
+      </p:pic>
+      <p:pic>
+        <p:nvPicPr>
+          <p:cNvPr id="14" name="服务器笑脸">
+            <a:extLst>
+              <a:ext uri="{FF2B5EF4-FFF2-40B4-BE49-F238E27FC236}">
+                <a16:creationId xmlns:a16="http://schemas.microsoft.com/office/drawing/2014/main" id="{E05928EE-7C11-473D-8B08-E17A60C82EED}"/>
+              </a:ext>
+            </a:extLst>
+          </p:cNvPr>
+          <p:cNvPicPr>
+            <a:picLocks noChangeAspect="1"/>
+          </p:cNvPicPr>
+          <p:nvPr/>
+        </p:nvPicPr>
+        <p:blipFill>
+          <a:blip r:embed="rId4"/>
+          <a:stretch>
+            <a:fillRect/>
+          </a:stretch>
+        </p:blipFill>
+        <p:spPr>
+          <a:xfrm>
+            <a:off x="4840622" y="1298371"/>
+            <a:ext cx="419100" cy="419100"/>
+          </a:xfrm>
+          <a:prstGeom prst="rect">
+            <a:avLst/>
+          </a:prstGeom>
+        </p:spPr>
+      </p:pic>
+      <p:sp>
+        <p:nvSpPr>
+          <p:cNvPr id="16" name="文本框 15">
+            <a:extLst>
+              <a:ext uri="{FF2B5EF4-FFF2-40B4-BE49-F238E27FC236}">
+                <a16:creationId xmlns:a16="http://schemas.microsoft.com/office/drawing/2014/main" id="{CC46A2E6-CE6B-4F02-B02B-0F626B3F88F9}"/>
+              </a:ext>
+            </a:extLst>
+          </p:cNvPr>
+          <p:cNvSpPr txBox="1"/>
+          <p:nvPr/>
+        </p:nvSpPr>
+        <p:spPr>
+          <a:xfrm>
+            <a:off x="729843" y="1471249"/>
+            <a:ext cx="2097049" cy="553998"/>
+          </a:xfrm>
+          <a:prstGeom prst="rect">
+            <a:avLst/>
+          </a:prstGeom>
+          <a:noFill/>
+        </p:spPr>
+        <p:txBody>
+          <a:bodyPr wrap="none" rtlCol="0">
+            <a:spAutoFit/>
+          </a:bodyPr>
+          <a:lstStyle/>
+          <a:p>
+            <a:r>
+              <a:rPr lang="en-US" altLang="zh-CN" sz="3000" dirty="0">
+                <a:solidFill>
+                  <a:srgbClr val="FF0000"/>
+                </a:solidFill>
+                <a:latin typeface="Times New Roman" panose="02020603050405020304" pitchFamily="18" charset="0"/>
+                <a:cs typeface="Times New Roman" panose="02020603050405020304" pitchFamily="18" charset="0"/>
+              </a:rPr>
+              <a:t>1</a:t>
+            </a:r>
+            <a:r>
+              <a:rPr lang="en-US" altLang="zh-CN" sz="3000" dirty="0">
+                <a:latin typeface="Times New Roman" panose="02020603050405020304" pitchFamily="18" charset="0"/>
+                <a:cs typeface="Times New Roman" panose="02020603050405020304" pitchFamily="18" charset="0"/>
+              </a:rPr>
+              <a:t> to </a:t>
+            </a:r>
+            <a:r>
+              <a:rPr lang="en-US" altLang="zh-CN" sz="3000" dirty="0">
+                <a:solidFill>
+                  <a:srgbClr val="FF0000"/>
+                </a:solidFill>
+                <a:latin typeface="Times New Roman" panose="02020603050405020304" pitchFamily="18" charset="0"/>
+                <a:cs typeface="Times New Roman" panose="02020603050405020304" pitchFamily="18" charset="0"/>
+              </a:rPr>
+              <a:t>n</a:t>
+            </a:r>
+            <a:r>
+              <a:rPr lang="en-US" altLang="zh-CN" sz="3000" dirty="0">
+                <a:latin typeface="Times New Roman" panose="02020603050405020304" pitchFamily="18" charset="0"/>
+                <a:cs typeface="Times New Roman" panose="02020603050405020304" pitchFamily="18" charset="0"/>
+              </a:rPr>
+              <a:t> POST</a:t>
+            </a:r>
+            <a:endParaRPr lang="zh-CN" altLang="en-US" sz="3000" dirty="0">
+              <a:latin typeface="Times New Roman" panose="02020603050405020304" pitchFamily="18" charset="0"/>
+              <a:cs typeface="Times New Roman" panose="02020603050405020304" pitchFamily="18" charset="0"/>
+            </a:endParaRPr>
+          </a:p>
+        </p:txBody>
+      </p:sp>
+      <p:pic>
+        <p:nvPicPr>
+          <p:cNvPr id="17" name="信封2server">
+            <a:extLst>
+              <a:ext uri="{FF2B5EF4-FFF2-40B4-BE49-F238E27FC236}">
+                <a16:creationId xmlns:a16="http://schemas.microsoft.com/office/drawing/2014/main" id="{7F662E14-231A-4E12-89B2-7198DE03E77A}"/>
+              </a:ext>
+            </a:extLst>
+          </p:cNvPr>
+          <p:cNvPicPr>
+            <a:picLocks noChangeAspect="1"/>
+          </p:cNvPicPr>
+          <p:nvPr/>
+        </p:nvPicPr>
+        <p:blipFill>
+          <a:blip r:embed="rId3">
+            <a:extLst>
+              <a:ext uri="{28A0092B-C50C-407E-A947-70E740481C1C}">
+                <a14:useLocalDpi xmlns:a14="http://schemas.microsoft.com/office/drawing/2010/main" val="0"/>
+              </a:ext>
+            </a:extLst>
+          </a:blip>
+          <a:srcRect/>
+          <a:stretch/>
+        </p:blipFill>
+        <p:spPr>
+          <a:xfrm>
+            <a:off x="4114399" y="1313329"/>
+            <a:ext cx="533801" cy="373661"/>
+          </a:xfrm>
+          <a:prstGeom prst="rect">
+            <a:avLst/>
+          </a:prstGeom>
+        </p:spPr>
+      </p:pic>
+      <p:pic>
+        <p:nvPicPr>
+          <p:cNvPr id="20" name="信封2Tom">
+            <a:extLst>
+              <a:ext uri="{FF2B5EF4-FFF2-40B4-BE49-F238E27FC236}">
+                <a16:creationId xmlns:a16="http://schemas.microsoft.com/office/drawing/2014/main" id="{2FAB6BF7-A9D7-429C-820C-1EBD8C1BDCFD}"/>
+              </a:ext>
+            </a:extLst>
+          </p:cNvPr>
+          <p:cNvPicPr>
+            <a:picLocks noChangeAspect="1"/>
+          </p:cNvPicPr>
+          <p:nvPr/>
+        </p:nvPicPr>
+        <p:blipFill>
+          <a:blip r:embed="rId3">
+            <a:extLst>
+              <a:ext uri="{28A0092B-C50C-407E-A947-70E740481C1C}">
+                <a14:useLocalDpi xmlns:a14="http://schemas.microsoft.com/office/drawing/2010/main" val="0"/>
+              </a:ext>
+            </a:extLst>
+          </a:blip>
+          <a:srcRect/>
+          <a:stretch/>
+        </p:blipFill>
+        <p:spPr>
+          <a:xfrm>
+            <a:off x="4114399" y="1313328"/>
+            <a:ext cx="533801" cy="373661"/>
+          </a:xfrm>
+          <a:prstGeom prst="rect">
+            <a:avLst/>
+          </a:prstGeom>
+        </p:spPr>
+      </p:pic>
+      <p:pic>
+        <p:nvPicPr>
+          <p:cNvPr id="21" name="信封2A@Tom">
+            <a:extLst>
+              <a:ext uri="{FF2B5EF4-FFF2-40B4-BE49-F238E27FC236}">
+                <a16:creationId xmlns:a16="http://schemas.microsoft.com/office/drawing/2014/main" id="{7EB09F82-25FD-43B0-99B9-36E87FBB14DA}"/>
+              </a:ext>
+            </a:extLst>
+          </p:cNvPr>
+          <p:cNvPicPr>
+            <a:picLocks noChangeAspect="1"/>
+          </p:cNvPicPr>
+          <p:nvPr/>
+        </p:nvPicPr>
+        <p:blipFill>
+          <a:blip r:embed="rId3">
+            <a:extLst>
+              <a:ext uri="{28A0092B-C50C-407E-A947-70E740481C1C}">
+                <a14:useLocalDpi xmlns:a14="http://schemas.microsoft.com/office/drawing/2010/main" val="0"/>
+              </a:ext>
+            </a:extLst>
+          </a:blip>
+          <a:srcRect/>
+          <a:stretch/>
+        </p:blipFill>
+        <p:spPr>
+          <a:xfrm>
+            <a:off x="4394050" y="4015287"/>
+            <a:ext cx="533801" cy="373661"/>
+          </a:xfrm>
+          <a:prstGeom prst="rect">
+            <a:avLst/>
+          </a:prstGeom>
+        </p:spPr>
+      </p:pic>
+      <p:pic>
+        <p:nvPicPr>
+          <p:cNvPr id="22" name="信封2C@Tom">
+            <a:extLst>
+              <a:ext uri="{FF2B5EF4-FFF2-40B4-BE49-F238E27FC236}">
+                <a16:creationId xmlns:a16="http://schemas.microsoft.com/office/drawing/2014/main" id="{D11CB1D5-4E59-4FFA-9022-12838815BB66}"/>
+              </a:ext>
+            </a:extLst>
+          </p:cNvPr>
+          <p:cNvPicPr>
+            <a:picLocks noChangeAspect="1"/>
+          </p:cNvPicPr>
+          <p:nvPr/>
+        </p:nvPicPr>
+        <p:blipFill>
+          <a:blip r:embed="rId3">
+            <a:extLst>
+              <a:ext uri="{28A0092B-C50C-407E-A947-70E740481C1C}">
+                <a14:useLocalDpi xmlns:a14="http://schemas.microsoft.com/office/drawing/2010/main" val="0"/>
+              </a:ext>
+            </a:extLst>
+          </a:blip>
+          <a:srcRect/>
+          <a:stretch/>
+        </p:blipFill>
+        <p:spPr>
+          <a:xfrm>
+            <a:off x="4394050" y="4015113"/>
+            <a:ext cx="533801" cy="373661"/>
+          </a:xfrm>
+          <a:prstGeom prst="rect">
+            <a:avLst/>
+          </a:prstGeom>
+        </p:spPr>
+      </p:pic>
+      <p:pic>
+        <p:nvPicPr>
+          <p:cNvPr id="23" name="信封2A@server">
+            <a:extLst>
+              <a:ext uri="{FF2B5EF4-FFF2-40B4-BE49-F238E27FC236}">
+                <a16:creationId xmlns:a16="http://schemas.microsoft.com/office/drawing/2014/main" id="{E3A72076-2F2A-466F-80E1-478709BAD2FC}"/>
+              </a:ext>
+            </a:extLst>
+          </p:cNvPr>
+          <p:cNvPicPr>
+            <a:picLocks noChangeAspect="1"/>
+          </p:cNvPicPr>
+          <p:nvPr/>
+        </p:nvPicPr>
+        <p:blipFill>
+          <a:blip r:embed="rId3">
+            <a:extLst>
+              <a:ext uri="{28A0092B-C50C-407E-A947-70E740481C1C}">
+                <a14:useLocalDpi xmlns:a14="http://schemas.microsoft.com/office/drawing/2010/main" val="0"/>
+              </a:ext>
+            </a:extLst>
+          </a:blip>
+          <a:srcRect/>
+          <a:stretch/>
+        </p:blipFill>
+        <p:spPr>
+          <a:xfrm>
+            <a:off x="7587908" y="4015287"/>
+            <a:ext cx="533801" cy="373661"/>
+          </a:xfrm>
+          <a:prstGeom prst="rect">
+            <a:avLst/>
+          </a:prstGeom>
+        </p:spPr>
+      </p:pic>
+      <p:pic>
+        <p:nvPicPr>
+          <p:cNvPr id="24" name="信封2C@server">
+            <a:extLst>
+              <a:ext uri="{FF2B5EF4-FFF2-40B4-BE49-F238E27FC236}">
+                <a16:creationId xmlns:a16="http://schemas.microsoft.com/office/drawing/2014/main" id="{5C54FCCE-66A5-401E-9172-F23F650016EA}"/>
+              </a:ext>
+            </a:extLst>
+          </p:cNvPr>
+          <p:cNvPicPr>
+            <a:picLocks noChangeAspect="1"/>
+          </p:cNvPicPr>
+          <p:nvPr/>
+        </p:nvPicPr>
+        <p:blipFill>
+          <a:blip r:embed="rId3">
+            <a:extLst>
+              <a:ext uri="{28A0092B-C50C-407E-A947-70E740481C1C}">
+                <a14:useLocalDpi xmlns:a14="http://schemas.microsoft.com/office/drawing/2010/main" val="0"/>
+              </a:ext>
+            </a:extLst>
+          </a:blip>
+          <a:srcRect/>
+          <a:stretch/>
+        </p:blipFill>
+        <p:spPr>
+          <a:xfrm>
+            <a:off x="7587908" y="4015113"/>
+            <a:ext cx="533801" cy="373661"/>
+          </a:xfrm>
+          <a:prstGeom prst="rect">
+            <a:avLst/>
+          </a:prstGeom>
+        </p:spPr>
+      </p:pic>
+      <p:pic>
+        <p:nvPicPr>
+          <p:cNvPr id="15" name="客户端笑脸A@Tom">
+            <a:extLst>
+              <a:ext uri="{FF2B5EF4-FFF2-40B4-BE49-F238E27FC236}">
+                <a16:creationId xmlns:a16="http://schemas.microsoft.com/office/drawing/2014/main" id="{7B0DD1CD-8E13-4546-9ED6-4D2359EA0830}"/>
+              </a:ext>
+            </a:extLst>
+          </p:cNvPr>
+          <p:cNvPicPr>
+            <a:picLocks noChangeAspect="1"/>
+          </p:cNvPicPr>
+          <p:nvPr/>
+        </p:nvPicPr>
+        <p:blipFill>
+          <a:blip r:embed="rId4"/>
+          <a:stretch>
+            <a:fillRect/>
+          </a:stretch>
+        </p:blipFill>
+        <p:spPr>
+          <a:xfrm>
+            <a:off x="3600297" y="4907734"/>
+            <a:ext cx="419100" cy="419100"/>
+          </a:xfrm>
+          <a:prstGeom prst="rect">
+            <a:avLst/>
+          </a:prstGeom>
+        </p:spPr>
+      </p:pic>
+      <p:pic>
+        <p:nvPicPr>
+          <p:cNvPr id="25" name="客户端笑脸C@Tom">
+            <a:extLst>
+              <a:ext uri="{FF2B5EF4-FFF2-40B4-BE49-F238E27FC236}">
+                <a16:creationId xmlns:a16="http://schemas.microsoft.com/office/drawing/2014/main" id="{DB5BB6B4-9AC6-4F71-9B5E-6CCB4404D304}"/>
+              </a:ext>
+            </a:extLst>
+          </p:cNvPr>
+          <p:cNvPicPr>
+            <a:picLocks noChangeAspect="1"/>
+          </p:cNvPicPr>
+          <p:nvPr/>
+        </p:nvPicPr>
+        <p:blipFill>
+          <a:blip r:embed="rId4"/>
+          <a:stretch>
+            <a:fillRect/>
+          </a:stretch>
+        </p:blipFill>
+        <p:spPr>
+          <a:xfrm>
+            <a:off x="4438650" y="4907734"/>
+            <a:ext cx="419100" cy="419100"/>
+          </a:xfrm>
+          <a:prstGeom prst="rect">
+            <a:avLst/>
+          </a:prstGeom>
+        </p:spPr>
+      </p:pic>
+      <p:pic>
+        <p:nvPicPr>
+          <p:cNvPr id="26" name="客户端笑脸A@server">
+            <a:extLst>
+              <a:ext uri="{FF2B5EF4-FFF2-40B4-BE49-F238E27FC236}">
+                <a16:creationId xmlns:a16="http://schemas.microsoft.com/office/drawing/2014/main" id="{7545EF95-6655-4611-99EF-7D45E268F1E8}"/>
+              </a:ext>
+            </a:extLst>
+          </p:cNvPr>
+          <p:cNvPicPr>
+            <a:picLocks noChangeAspect="1"/>
+          </p:cNvPicPr>
+          <p:nvPr/>
+        </p:nvPicPr>
+        <p:blipFill>
+          <a:blip r:embed="rId4"/>
+          <a:stretch>
+            <a:fillRect/>
+          </a:stretch>
+        </p:blipFill>
+        <p:spPr>
+          <a:xfrm>
+            <a:off x="6634905" y="4907734"/>
+            <a:ext cx="419100" cy="419100"/>
+          </a:xfrm>
+          <a:prstGeom prst="rect">
+            <a:avLst/>
+          </a:prstGeom>
+        </p:spPr>
+      </p:pic>
+      <p:pic>
+        <p:nvPicPr>
+          <p:cNvPr id="27" name="客户端笑脸C@server">
+            <a:extLst>
+              <a:ext uri="{FF2B5EF4-FFF2-40B4-BE49-F238E27FC236}">
+                <a16:creationId xmlns:a16="http://schemas.microsoft.com/office/drawing/2014/main" id="{1CB7BE6C-18F5-4621-8F8E-2FB6F725D291}"/>
+              </a:ext>
+            </a:extLst>
+          </p:cNvPr>
+          <p:cNvPicPr>
+            <a:picLocks noChangeAspect="1"/>
+          </p:cNvPicPr>
+          <p:nvPr/>
+        </p:nvPicPr>
+        <p:blipFill>
+          <a:blip r:embed="rId4"/>
+          <a:stretch>
+            <a:fillRect/>
+          </a:stretch>
+        </p:blipFill>
+        <p:spPr>
+          <a:xfrm>
+            <a:off x="7480725" y="4907734"/>
+            <a:ext cx="419100" cy="419100"/>
+          </a:xfrm>
+          <a:prstGeom prst="rect">
+            <a:avLst/>
+          </a:prstGeom>
+        </p:spPr>
+      </p:pic>
+    </p:spTree>
+    <p:extLst>
+      <p:ext uri="{BB962C8B-B14F-4D97-AF65-F5344CB8AC3E}">
+        <p14:creationId xmlns:p14="http://schemas.microsoft.com/office/powerpoint/2010/main" val="1895805369"/>
+      </p:ext>
+    </p:extLst>
+  </p:cSld>
+  <p:clrMapOvr>
+    <a:masterClrMapping/>
+  </p:clrMapOvr>
+  <p:timing>
+    <p:tnLst>
+      <p:par>
+        <p:cTn id="1" dur="indefinite" restart="never" nodeType="tmRoot">
+          <p:childTnLst>
+            <p:seq concurrent="1" nextAc="seek">
+              <p:cTn id="2" dur="indefinite" nodeType="mainSeq">
+                <p:childTnLst>
+                  <p:par>
+                    <p:cTn id="3" fill="hold">
+                      <p:stCondLst>
+                        <p:cond delay="indefinite"/>
+                        <p:cond evt="onBegin" delay="0">
+                          <p:tn val="2"/>
+                        </p:cond>
+                      </p:stCondLst>
+                      <p:childTnLst>
+                        <p:par>
+                          <p:cTn id="4" fill="hold">
+                            <p:stCondLst>
+                              <p:cond delay="0"/>
+                            </p:stCondLst>
+                            <p:childTnLst>
+                              <p:par>
+                                <p:cTn id="5" presetID="1" presetClass="entr" presetSubtype="0" fill="hold" grpId="0" nodeType="afterEffect">
+                                  <p:stCondLst>
+                                    <p:cond delay="0"/>
+                                  </p:stCondLst>
+                                  <p:childTnLst>
+                                    <p:set>
+                                      <p:cBhvr>
+                                        <p:cTn id="6" dur="1" fill="hold">
+                                          <p:stCondLst>
+                                            <p:cond delay="0"/>
+                                          </p:stCondLst>
+                                        </p:cTn>
+                                        <p:tgtEl>
+                                          <p:spTgt spid="10"/>
+                                        </p:tgtEl>
+                                        <p:attrNameLst>
+                                          <p:attrName>style.visibility</p:attrName>
+                                        </p:attrNameLst>
+                                      </p:cBhvr>
+                                      <p:to>
+                                        <p:strVal val="visible"/>
+                                      </p:to>
+                                    </p:set>
+                                  </p:childTnLst>
+                                </p:cTn>
+                              </p:par>
+                            </p:childTnLst>
+                          </p:cTn>
+                        </p:par>
+                        <p:par>
+                          <p:cTn id="7" fill="hold">
+                            <p:stCondLst>
+                              <p:cond delay="0"/>
+                            </p:stCondLst>
+                            <p:childTnLst>
+                              <p:par>
+                                <p:cTn id="8" presetID="41" presetClass="entr" presetSubtype="0" fill="hold" grpId="0" nodeType="afterEffect">
+                                  <p:stCondLst>
+                                    <p:cond delay="0"/>
+                                  </p:stCondLst>
+                                  <p:iterate type="lt">
+                                    <p:tmPct val="10000"/>
+                                  </p:iterate>
+                                  <p:childTnLst>
+                                    <p:set>
+                                      <p:cBhvr>
+                                        <p:cTn id="9" dur="1" fill="hold">
+                                          <p:stCondLst>
+                                            <p:cond delay="0"/>
+                                          </p:stCondLst>
+                                        </p:cTn>
+                                        <p:tgtEl>
+                                          <p:spTgt spid="11"/>
+                                        </p:tgtEl>
+                                        <p:attrNameLst>
+                                          <p:attrName>style.visibility</p:attrName>
+                                        </p:attrNameLst>
+                                      </p:cBhvr>
+                                      <p:to>
+                                        <p:strVal val="visible"/>
+                                      </p:to>
+                                    </p:set>
+                                    <p:anim calcmode="lin" valueType="num">
+                                      <p:cBhvr>
+                                        <p:cTn id="10" dur="100" fill="hold"/>
+                                        <p:tgtEl>
+                                          <p:spTgt spid="11"/>
+                                        </p:tgtEl>
+                                        <p:attrNameLst>
+                                          <p:attrName>ppt_x</p:attrName>
+                                        </p:attrNameLst>
+                                      </p:cBhvr>
+                                      <p:tavLst>
+                                        <p:tav tm="0">
+                                          <p:val>
+                                            <p:strVal val="#ppt_x"/>
+                                          </p:val>
+                                        </p:tav>
+                                        <p:tav tm="50000">
+                                          <p:val>
+                                            <p:strVal val="#ppt_x+.1"/>
+                                          </p:val>
+                                        </p:tav>
+                                        <p:tav tm="100000">
+                                          <p:val>
+                                            <p:strVal val="#ppt_x"/>
+                                          </p:val>
+                                        </p:tav>
+                                      </p:tavLst>
+                                    </p:anim>
+                                    <p:anim calcmode="lin" valueType="num">
+                                      <p:cBhvr>
+                                        <p:cTn id="11" dur="100" fill="hold"/>
+                                        <p:tgtEl>
+                                          <p:spTgt spid="11"/>
+                                        </p:tgtEl>
+                                        <p:attrNameLst>
+                                          <p:attrName>ppt_y</p:attrName>
+                                        </p:attrNameLst>
+                                      </p:cBhvr>
+                                      <p:tavLst>
+                                        <p:tav tm="0">
+                                          <p:val>
+                                            <p:strVal val="#ppt_y"/>
+                                          </p:val>
+                                        </p:tav>
+                                        <p:tav tm="100000">
+                                          <p:val>
+                                            <p:strVal val="#ppt_y"/>
+                                          </p:val>
+                                        </p:tav>
+                                      </p:tavLst>
+                                    </p:anim>
+                                    <p:anim calcmode="lin" valueType="num">
+                                      <p:cBhvr>
+                                        <p:cTn id="12" dur="100" fill="hold"/>
+                                        <p:tgtEl>
+                                          <p:spTgt spid="11"/>
+                                        </p:tgtEl>
+                                        <p:attrNameLst>
+                                          <p:attrName>ppt_h</p:attrName>
+                                        </p:attrNameLst>
+                                      </p:cBhvr>
+                                      <p:tavLst>
+                                        <p:tav tm="0">
+                                          <p:val>
+                                            <p:strVal val="#ppt_h/10"/>
+                                          </p:val>
+                                        </p:tav>
+                                        <p:tav tm="50000">
+                                          <p:val>
+                                            <p:strVal val="#ppt_h+.01"/>
+                                          </p:val>
+                                        </p:tav>
+                                        <p:tav tm="100000">
+                                          <p:val>
+                                            <p:strVal val="#ppt_h"/>
+                                          </p:val>
+                                        </p:tav>
+                                      </p:tavLst>
+                                    </p:anim>
+                                    <p:anim calcmode="lin" valueType="num">
+                                      <p:cBhvr>
+                                        <p:cTn id="13" dur="100" fill="hold"/>
+                                        <p:tgtEl>
+                                          <p:spTgt spid="11"/>
+                                        </p:tgtEl>
+                                        <p:attrNameLst>
+                                          <p:attrName>ppt_w</p:attrName>
+                                        </p:attrNameLst>
+                                      </p:cBhvr>
+                                      <p:tavLst>
+                                        <p:tav tm="0">
+                                          <p:val>
+                                            <p:strVal val="#ppt_w/10"/>
+                                          </p:val>
+                                        </p:tav>
+                                        <p:tav tm="50000">
+                                          <p:val>
+                                            <p:strVal val="#ppt_w+.01"/>
+                                          </p:val>
+                                        </p:tav>
+                                        <p:tav tm="100000">
+                                          <p:val>
+                                            <p:strVal val="#ppt_w"/>
+                                          </p:val>
+                                        </p:tav>
+                                      </p:tavLst>
+                                    </p:anim>
+                                    <p:animEffect transition="in" filter="fade">
+                                      <p:cBhvr>
+                                        <p:cTn id="14" dur="100" tmFilter="0,0; .5, 1; 1, 1"/>
+                                        <p:tgtEl>
+                                          <p:spTgt spid="11"/>
+                                        </p:tgtEl>
+                                      </p:cBhvr>
+                                    </p:animEffect>
+                                  </p:childTnLst>
+                                </p:cTn>
+                              </p:par>
+                            </p:childTnLst>
+                          </p:cTn>
+                        </p:par>
+                        <p:par>
+                          <p:cTn id="15" fill="hold">
+                            <p:stCondLst>
+                              <p:cond delay="730"/>
+                            </p:stCondLst>
+                            <p:childTnLst>
+                              <p:par>
+                                <p:cTn id="16" presetID="1" presetClass="entr" presetSubtype="0" fill="hold" nodeType="afterEffect">
+                                  <p:stCondLst>
+                                    <p:cond delay="2000"/>
+                                  </p:stCondLst>
+                                  <p:childTnLst>
+                                    <p:set>
+                                      <p:cBhvr>
+                                        <p:cTn id="17" dur="1" fill="hold">
+                                          <p:stCondLst>
+                                            <p:cond delay="0"/>
+                                          </p:stCondLst>
+                                        </p:cTn>
+                                        <p:tgtEl>
+                                          <p:spTgt spid="12"/>
+                                        </p:tgtEl>
+                                        <p:attrNameLst>
+                                          <p:attrName>style.visibility</p:attrName>
+                                        </p:attrNameLst>
+                                      </p:cBhvr>
+                                      <p:to>
+                                        <p:strVal val="visible"/>
+                                      </p:to>
+                                    </p:set>
+                                  </p:childTnLst>
+                                </p:cTn>
+                              </p:par>
+                            </p:childTnLst>
+                          </p:cTn>
+                        </p:par>
+                        <p:par>
+                          <p:cTn id="18" fill="hold">
+                            <p:stCondLst>
+                              <p:cond delay="2730"/>
+                            </p:stCondLst>
+                            <p:childTnLst>
+                              <p:par>
+                                <p:cTn id="19" presetID="53" presetClass="exit" presetSubtype="32" fill="hold" grpId="1" nodeType="afterEffect">
+                                  <p:stCondLst>
+                                    <p:cond delay="1000"/>
+                                  </p:stCondLst>
+                                  <p:childTnLst>
+                                    <p:anim calcmode="lin" valueType="num">
+                                      <p:cBhvr>
+                                        <p:cTn id="20" dur="1100"/>
+                                        <p:tgtEl>
+                                          <p:spTgt spid="10"/>
+                                        </p:tgtEl>
+                                        <p:attrNameLst>
+                                          <p:attrName>ppt_w</p:attrName>
+                                        </p:attrNameLst>
+                                      </p:cBhvr>
+                                      <p:tavLst>
+                                        <p:tav tm="0">
+                                          <p:val>
+                                            <p:strVal val="ppt_w"/>
+                                          </p:val>
+                                        </p:tav>
+                                        <p:tav tm="100000">
+                                          <p:val>
+                                            <p:fltVal val="0"/>
+                                          </p:val>
+                                        </p:tav>
+                                      </p:tavLst>
+                                    </p:anim>
+                                    <p:anim calcmode="lin" valueType="num">
+                                      <p:cBhvr>
+                                        <p:cTn id="21" dur="1100"/>
+                                        <p:tgtEl>
+                                          <p:spTgt spid="10"/>
+                                        </p:tgtEl>
+                                        <p:attrNameLst>
+                                          <p:attrName>ppt_h</p:attrName>
+                                        </p:attrNameLst>
+                                      </p:cBhvr>
+                                      <p:tavLst>
+                                        <p:tav tm="0">
+                                          <p:val>
+                                            <p:strVal val="ppt_h"/>
+                                          </p:val>
+                                        </p:tav>
+                                        <p:tav tm="100000">
+                                          <p:val>
+                                            <p:fltVal val="0"/>
+                                          </p:val>
+                                        </p:tav>
+                                      </p:tavLst>
+                                    </p:anim>
+                                    <p:animEffect transition="out" filter="fade">
+                                      <p:cBhvr>
+                                        <p:cTn id="22" dur="1100"/>
+                                        <p:tgtEl>
+                                          <p:spTgt spid="10"/>
+                                        </p:tgtEl>
+                                      </p:cBhvr>
+                                    </p:animEffect>
+                                    <p:set>
+                                      <p:cBhvr>
+                                        <p:cTn id="23" dur="1" fill="hold">
+                                          <p:stCondLst>
+                                            <p:cond delay="1099"/>
+                                          </p:stCondLst>
+                                        </p:cTn>
+                                        <p:tgtEl>
+                                          <p:spTgt spid="10"/>
+                                        </p:tgtEl>
+                                        <p:attrNameLst>
+                                          <p:attrName>style.visibility</p:attrName>
+                                        </p:attrNameLst>
+                                      </p:cBhvr>
+                                      <p:to>
+                                        <p:strVal val="hidden"/>
+                                      </p:to>
+                                    </p:set>
+                                  </p:childTnLst>
+                                </p:cTn>
+                              </p:par>
+                              <p:par>
+                                <p:cTn id="24" presetID="53" presetClass="exit" presetSubtype="32" fill="hold" grpId="1" nodeType="withEffect">
+                                  <p:stCondLst>
+                                    <p:cond delay="1000"/>
+                                  </p:stCondLst>
+                                  <p:iterate type="lt">
+                                    <p:tmPct val="0"/>
+                                  </p:iterate>
+                                  <p:childTnLst>
+                                    <p:anim calcmode="lin" valueType="num">
+                                      <p:cBhvr>
+                                        <p:cTn id="25" dur="1100"/>
+                                        <p:tgtEl>
+                                          <p:spTgt spid="11"/>
+                                        </p:tgtEl>
+                                        <p:attrNameLst>
+                                          <p:attrName>ppt_w</p:attrName>
+                                        </p:attrNameLst>
+                                      </p:cBhvr>
+                                      <p:tavLst>
+                                        <p:tav tm="0">
+                                          <p:val>
+                                            <p:strVal val="ppt_w"/>
+                                          </p:val>
+                                        </p:tav>
+                                        <p:tav tm="100000">
+                                          <p:val>
+                                            <p:fltVal val="0"/>
+                                          </p:val>
+                                        </p:tav>
+                                      </p:tavLst>
+                                    </p:anim>
+                                    <p:anim calcmode="lin" valueType="num">
+                                      <p:cBhvr>
+                                        <p:cTn id="26" dur="1100"/>
+                                        <p:tgtEl>
+                                          <p:spTgt spid="11"/>
+                                        </p:tgtEl>
+                                        <p:attrNameLst>
+                                          <p:attrName>ppt_h</p:attrName>
+                                        </p:attrNameLst>
+                                      </p:cBhvr>
+                                      <p:tavLst>
+                                        <p:tav tm="0">
+                                          <p:val>
+                                            <p:strVal val="ppt_h"/>
+                                          </p:val>
+                                        </p:tav>
+                                        <p:tav tm="100000">
+                                          <p:val>
+                                            <p:fltVal val="0"/>
+                                          </p:val>
+                                        </p:tav>
+                                      </p:tavLst>
+                                    </p:anim>
+                                    <p:animEffect transition="out" filter="fade">
+                                      <p:cBhvr>
+                                        <p:cTn id="27" dur="1100"/>
+                                        <p:tgtEl>
+                                          <p:spTgt spid="11"/>
+                                        </p:tgtEl>
+                                      </p:cBhvr>
+                                    </p:animEffect>
+                                    <p:set>
+                                      <p:cBhvr>
+                                        <p:cTn id="28" dur="1" fill="hold">
+                                          <p:stCondLst>
+                                            <p:cond delay="1099"/>
+                                          </p:stCondLst>
+                                        </p:cTn>
+                                        <p:tgtEl>
+                                          <p:spTgt spid="11"/>
+                                        </p:tgtEl>
+                                        <p:attrNameLst>
+                                          <p:attrName>style.visibility</p:attrName>
+                                        </p:attrNameLst>
+                                      </p:cBhvr>
+                                      <p:to>
+                                        <p:strVal val="hidden"/>
+                                      </p:to>
+                                    </p:set>
+                                  </p:childTnLst>
+                                </p:cTn>
+                              </p:par>
+                              <p:par>
+                                <p:cTn id="29" presetID="53" presetClass="exit" presetSubtype="32" fill="hold" nodeType="withEffect">
+                                  <p:stCondLst>
+                                    <p:cond delay="1000"/>
+                                  </p:stCondLst>
+                                  <p:childTnLst>
+                                    <p:anim calcmode="lin" valueType="num">
+                                      <p:cBhvr>
+                                        <p:cTn id="30" dur="1100"/>
+                                        <p:tgtEl>
+                                          <p:spTgt spid="12"/>
+                                        </p:tgtEl>
+                                        <p:attrNameLst>
+                                          <p:attrName>ppt_w</p:attrName>
+                                        </p:attrNameLst>
+                                      </p:cBhvr>
+                                      <p:tavLst>
+                                        <p:tav tm="0">
+                                          <p:val>
+                                            <p:strVal val="ppt_w"/>
+                                          </p:val>
+                                        </p:tav>
+                                        <p:tav tm="100000">
+                                          <p:val>
+                                            <p:fltVal val="0"/>
+                                          </p:val>
+                                        </p:tav>
+                                      </p:tavLst>
+                                    </p:anim>
+                                    <p:anim calcmode="lin" valueType="num">
+                                      <p:cBhvr>
+                                        <p:cTn id="31" dur="1100"/>
+                                        <p:tgtEl>
+                                          <p:spTgt spid="12"/>
+                                        </p:tgtEl>
+                                        <p:attrNameLst>
+                                          <p:attrName>ppt_h</p:attrName>
+                                        </p:attrNameLst>
+                                      </p:cBhvr>
+                                      <p:tavLst>
+                                        <p:tav tm="0">
+                                          <p:val>
+                                            <p:strVal val="ppt_h"/>
+                                          </p:val>
+                                        </p:tav>
+                                        <p:tav tm="100000">
+                                          <p:val>
+                                            <p:fltVal val="0"/>
+                                          </p:val>
+                                        </p:tav>
+                                      </p:tavLst>
+                                    </p:anim>
+                                    <p:animEffect transition="out" filter="fade">
+                                      <p:cBhvr>
+                                        <p:cTn id="32" dur="1100"/>
+                                        <p:tgtEl>
+                                          <p:spTgt spid="12"/>
+                                        </p:tgtEl>
+                                      </p:cBhvr>
+                                    </p:animEffect>
+                                    <p:set>
+                                      <p:cBhvr>
+                                        <p:cTn id="33" dur="1" fill="hold">
+                                          <p:stCondLst>
+                                            <p:cond delay="1099"/>
+                                          </p:stCondLst>
+                                        </p:cTn>
+                                        <p:tgtEl>
+                                          <p:spTgt spid="12"/>
+                                        </p:tgtEl>
+                                        <p:attrNameLst>
+                                          <p:attrName>style.visibility</p:attrName>
+                                        </p:attrNameLst>
+                                      </p:cBhvr>
+                                      <p:to>
+                                        <p:strVal val="hidden"/>
+                                      </p:to>
+                                    </p:set>
+                                  </p:childTnLst>
+                                </p:cTn>
+                              </p:par>
+                              <p:par>
+                                <p:cTn id="34" presetID="42" presetClass="path" presetSubtype="0" accel="50000" decel="50000" fill="hold" grpId="2" nodeType="withEffect">
+                                  <p:stCondLst>
+                                    <p:cond delay="1000"/>
+                                  </p:stCondLst>
+                                  <p:childTnLst>
+                                    <p:animMotion origin="layout" path="M 2.77778E-6 3.7037E-7 L -0.06615 0.18958 " pathEditMode="relative" rAng="0" ptsTypes="AA">
+                                      <p:cBhvr>
+                                        <p:cTn id="35" dur="1100" fill="hold"/>
+                                        <p:tgtEl>
+                                          <p:spTgt spid="10"/>
+                                        </p:tgtEl>
+                                        <p:attrNameLst>
+                                          <p:attrName>ppt_x</p:attrName>
+                                          <p:attrName>ppt_y</p:attrName>
+                                        </p:attrNameLst>
+                                      </p:cBhvr>
+                                      <p:rCtr x="-3316" y="9468"/>
+                                    </p:animMotion>
+                                  </p:childTnLst>
+                                </p:cTn>
+                              </p:par>
+                              <p:par>
+                                <p:cTn id="36" presetID="42" presetClass="path" presetSubtype="0" accel="50000" decel="50000" fill="hold" grpId="2" nodeType="withEffect">
+                                  <p:stCondLst>
+                                    <p:cond delay="1000"/>
+                                  </p:stCondLst>
+                                  <p:iterate type="lt">
+                                    <p:tmPct val="0"/>
+                                  </p:iterate>
+                                  <p:childTnLst>
+                                    <p:animMotion origin="layout" path="M 2.77778E-6 3.7037E-7 L -0.06007 0.18727 " pathEditMode="relative" rAng="0" ptsTypes="AA">
+                                      <p:cBhvr>
+                                        <p:cTn id="37" dur="1100" fill="hold"/>
+                                        <p:tgtEl>
+                                          <p:spTgt spid="11"/>
+                                        </p:tgtEl>
+                                        <p:attrNameLst>
+                                          <p:attrName>ppt_x</p:attrName>
+                                          <p:attrName>ppt_y</p:attrName>
+                                        </p:attrNameLst>
+                                      </p:cBhvr>
+                                      <p:rCtr x="-3003" y="9352"/>
+                                    </p:animMotion>
+                                  </p:childTnLst>
+                                </p:cTn>
+                              </p:par>
+                              <p:par>
+                                <p:cTn id="38" presetID="42" presetClass="path" presetSubtype="0" accel="50000" decel="50000" fill="hold" nodeType="withEffect">
+                                  <p:stCondLst>
+                                    <p:cond delay="1000"/>
+                                  </p:stCondLst>
+                                  <p:childTnLst>
+                                    <p:animMotion origin="layout" path="M -2.77778E-6 7.40741E-7 L -0.10642 0.11875 " pathEditMode="relative" rAng="0" ptsTypes="AA">
+                                      <p:cBhvr>
+                                        <p:cTn id="39" dur="1100" fill="hold"/>
+                                        <p:tgtEl>
+                                          <p:spTgt spid="12"/>
+                                        </p:tgtEl>
+                                        <p:attrNameLst>
+                                          <p:attrName>ppt_x</p:attrName>
+                                          <p:attrName>ppt_y</p:attrName>
+                                        </p:attrNameLst>
+                                      </p:cBhvr>
+                                      <p:rCtr x="-5330" y="5926"/>
+                                    </p:animMotion>
+                                  </p:childTnLst>
+                                </p:cTn>
+                              </p:par>
+                              <p:par>
+                                <p:cTn id="40" presetID="53" presetClass="entr" presetSubtype="16" fill="hold" nodeType="withEffect">
+                                  <p:stCondLst>
+                                    <p:cond delay="0"/>
+                                  </p:stCondLst>
+                                  <p:childTnLst>
+                                    <p:set>
+                                      <p:cBhvr>
+                                        <p:cTn id="41" dur="1" fill="hold">
+                                          <p:stCondLst>
+                                            <p:cond delay="0"/>
+                                          </p:stCondLst>
+                                        </p:cTn>
+                                        <p:tgtEl>
+                                          <p:spTgt spid="13"/>
+                                        </p:tgtEl>
+                                        <p:attrNameLst>
+                                          <p:attrName>style.visibility</p:attrName>
+                                        </p:attrNameLst>
+                                      </p:cBhvr>
+                                      <p:to>
+                                        <p:strVal val="visible"/>
+                                      </p:to>
+                                    </p:set>
+                                    <p:anim calcmode="lin" valueType="num">
+                                      <p:cBhvr>
+                                        <p:cTn id="42" dur="500" fill="hold"/>
+                                        <p:tgtEl>
+                                          <p:spTgt spid="13"/>
+                                        </p:tgtEl>
+                                        <p:attrNameLst>
+                                          <p:attrName>ppt_w</p:attrName>
+                                        </p:attrNameLst>
+                                      </p:cBhvr>
+                                      <p:tavLst>
+                                        <p:tav tm="0">
+                                          <p:val>
+                                            <p:fltVal val="0"/>
+                                          </p:val>
+                                        </p:tav>
+                                        <p:tav tm="100000">
+                                          <p:val>
+                                            <p:strVal val="#ppt_w"/>
+                                          </p:val>
+                                        </p:tav>
+                                      </p:tavLst>
+                                    </p:anim>
+                                    <p:anim calcmode="lin" valueType="num">
+                                      <p:cBhvr>
+                                        <p:cTn id="43" dur="500" fill="hold"/>
+                                        <p:tgtEl>
+                                          <p:spTgt spid="13"/>
+                                        </p:tgtEl>
+                                        <p:attrNameLst>
+                                          <p:attrName>ppt_h</p:attrName>
+                                        </p:attrNameLst>
+                                      </p:cBhvr>
+                                      <p:tavLst>
+                                        <p:tav tm="0">
+                                          <p:val>
+                                            <p:fltVal val="0"/>
+                                          </p:val>
+                                        </p:tav>
+                                        <p:tav tm="100000">
+                                          <p:val>
+                                            <p:strVal val="#ppt_h"/>
+                                          </p:val>
+                                        </p:tav>
+                                      </p:tavLst>
+                                    </p:anim>
+                                    <p:animEffect transition="in" filter="fade">
+                                      <p:cBhvr>
+                                        <p:cTn id="44" dur="500"/>
+                                        <p:tgtEl>
+                                          <p:spTgt spid="13"/>
+                                        </p:tgtEl>
+                                      </p:cBhvr>
+                                    </p:animEffect>
+                                  </p:childTnLst>
+                                </p:cTn>
+                              </p:par>
+                            </p:childTnLst>
+                          </p:cTn>
+                        </p:par>
+                        <p:par>
+                          <p:cTn id="45" fill="hold">
+                            <p:stCondLst>
+                              <p:cond delay="4830"/>
+                            </p:stCondLst>
+                            <p:childTnLst>
+                              <p:par>
+                                <p:cTn id="46" presetID="42" presetClass="path" presetSubtype="0" accel="50000" decel="50000" fill="hold" nodeType="afterEffect">
+                                  <p:stCondLst>
+                                    <p:cond delay="0"/>
+                                  </p:stCondLst>
+                                  <p:childTnLst>
+                                    <p:animMotion origin="layout" path="M 2.5E-6 4.44444E-6 L 0.00608 -0.10671 " pathEditMode="fixed" rAng="0" ptsTypes="AA">
+                                      <p:cBhvr>
+                                        <p:cTn id="47" dur="130" fill="hold"/>
+                                        <p:tgtEl>
+                                          <p:spTgt spid="13"/>
+                                        </p:tgtEl>
+                                        <p:attrNameLst>
+                                          <p:attrName>ppt_x</p:attrName>
+                                          <p:attrName>ppt_y</p:attrName>
+                                        </p:attrNameLst>
+                                      </p:cBhvr>
+                                      <p:rCtr x="243" y="-5301"/>
+                                    </p:animMotion>
+                                  </p:childTnLst>
+                                </p:cTn>
+                              </p:par>
+                            </p:childTnLst>
+                          </p:cTn>
+                        </p:par>
+                        <p:par>
+                          <p:cTn id="48" fill="hold">
+                            <p:stCondLst>
+                              <p:cond delay="4960"/>
+                            </p:stCondLst>
+                            <p:childTnLst>
+                              <p:par>
+                                <p:cTn id="49" presetID="42" presetClass="path" presetSubtype="0" accel="50000" decel="50000" fill="hold" nodeType="afterEffect">
+                                  <p:stCondLst>
+                                    <p:cond delay="0"/>
+                                  </p:stCondLst>
+                                  <p:childTnLst>
+                                    <p:animMotion origin="layout" path="M 0.00608 -0.10671 L 0.30052 -0.50046 " pathEditMode="relative" rAng="0" ptsTypes="AA">
+                                      <p:cBhvr>
+                                        <p:cTn id="50" dur="500" fill="hold"/>
+                                        <p:tgtEl>
+                                          <p:spTgt spid="13"/>
+                                        </p:tgtEl>
+                                        <p:attrNameLst>
+                                          <p:attrName>ppt_x</p:attrName>
+                                          <p:attrName>ppt_y</p:attrName>
+                                        </p:attrNameLst>
+                                      </p:cBhvr>
+                                      <p:rCtr x="14722" y="-19699"/>
+                                    </p:animMotion>
+                                  </p:childTnLst>
+                                </p:cTn>
+                              </p:par>
+                            </p:childTnLst>
+                          </p:cTn>
+                        </p:par>
+                        <p:par>
+                          <p:cTn id="51" fill="hold">
+                            <p:stCondLst>
+                              <p:cond delay="5460"/>
+                            </p:stCondLst>
+                            <p:childTnLst>
+                              <p:par>
+                                <p:cTn id="52" presetID="1" presetClass="exit" presetSubtype="0" fill="hold" nodeType="afterEffect">
+                                  <p:stCondLst>
+                                    <p:cond delay="0"/>
+                                  </p:stCondLst>
+                                  <p:childTnLst>
+                                    <p:set>
+                                      <p:cBhvr>
+                                        <p:cTn id="53" dur="1" fill="hold">
+                                          <p:stCondLst>
+                                            <p:cond delay="0"/>
+                                          </p:stCondLst>
+                                        </p:cTn>
+                                        <p:tgtEl>
+                                          <p:spTgt spid="13"/>
+                                        </p:tgtEl>
+                                        <p:attrNameLst>
+                                          <p:attrName>style.visibility</p:attrName>
+                                        </p:attrNameLst>
+                                      </p:cBhvr>
+                                      <p:to>
+                                        <p:strVal val="hidden"/>
+                                      </p:to>
+                                    </p:set>
+                                  </p:childTnLst>
+                                </p:cTn>
+                              </p:par>
+                            </p:childTnLst>
+                          </p:cTn>
+                        </p:par>
+                        <p:par>
+                          <p:cTn id="54" fill="hold">
+                            <p:stCondLst>
+                              <p:cond delay="5460"/>
+                            </p:stCondLst>
+                            <p:childTnLst>
+                              <p:par>
+                                <p:cTn id="55" presetID="53" presetClass="entr" presetSubtype="16" fill="hold" nodeType="afterEffect">
+                                  <p:stCondLst>
+                                    <p:cond delay="0"/>
+                                  </p:stCondLst>
+                                  <p:childTnLst>
+                                    <p:set>
+                                      <p:cBhvr>
+                                        <p:cTn id="56" dur="1" fill="hold">
+                                          <p:stCondLst>
+                                            <p:cond delay="0"/>
+                                          </p:stCondLst>
+                                        </p:cTn>
+                                        <p:tgtEl>
+                                          <p:spTgt spid="14"/>
+                                        </p:tgtEl>
+                                        <p:attrNameLst>
+                                          <p:attrName>style.visibility</p:attrName>
+                                        </p:attrNameLst>
+                                      </p:cBhvr>
+                                      <p:to>
+                                        <p:strVal val="visible"/>
+                                      </p:to>
+                                    </p:set>
+                                    <p:anim calcmode="lin" valueType="num">
+                                      <p:cBhvr>
+                                        <p:cTn id="57" dur="500" fill="hold"/>
+                                        <p:tgtEl>
+                                          <p:spTgt spid="14"/>
+                                        </p:tgtEl>
+                                        <p:attrNameLst>
+                                          <p:attrName>ppt_w</p:attrName>
+                                        </p:attrNameLst>
+                                      </p:cBhvr>
+                                      <p:tavLst>
+                                        <p:tav tm="0">
+                                          <p:val>
+                                            <p:fltVal val="0"/>
+                                          </p:val>
+                                        </p:tav>
+                                        <p:tav tm="100000">
+                                          <p:val>
+                                            <p:strVal val="#ppt_w"/>
+                                          </p:val>
+                                        </p:tav>
+                                      </p:tavLst>
+                                    </p:anim>
+                                    <p:anim calcmode="lin" valueType="num">
+                                      <p:cBhvr>
+                                        <p:cTn id="58" dur="500" fill="hold"/>
+                                        <p:tgtEl>
+                                          <p:spTgt spid="14"/>
+                                        </p:tgtEl>
+                                        <p:attrNameLst>
+                                          <p:attrName>ppt_h</p:attrName>
+                                        </p:attrNameLst>
+                                      </p:cBhvr>
+                                      <p:tavLst>
+                                        <p:tav tm="0">
+                                          <p:val>
+                                            <p:fltVal val="0"/>
+                                          </p:val>
+                                        </p:tav>
+                                        <p:tav tm="100000">
+                                          <p:val>
+                                            <p:strVal val="#ppt_h"/>
+                                          </p:val>
+                                        </p:tav>
+                                      </p:tavLst>
+                                    </p:anim>
+                                    <p:animEffect transition="in" filter="fade">
+                                      <p:cBhvr>
+                                        <p:cTn id="59" dur="500"/>
+                                        <p:tgtEl>
+                                          <p:spTgt spid="14"/>
+                                        </p:tgtEl>
+                                      </p:cBhvr>
+                                    </p:animEffect>
+                                  </p:childTnLst>
+                                </p:cTn>
+                              </p:par>
+                              <p:par>
+                                <p:cTn id="60" presetID="1" presetClass="entr" presetSubtype="0" fill="hold" nodeType="withEffect">
+                                  <p:stCondLst>
+                                    <p:cond delay="0"/>
+                                  </p:stCondLst>
+                                  <p:childTnLst>
+                                    <p:set>
+                                      <p:cBhvr>
+                                        <p:cTn id="61" dur="1" fill="hold">
+                                          <p:stCondLst>
+                                            <p:cond delay="0"/>
+                                          </p:stCondLst>
+                                        </p:cTn>
+                                        <p:tgtEl>
+                                          <p:spTgt spid="17"/>
+                                        </p:tgtEl>
+                                        <p:attrNameLst>
+                                          <p:attrName>style.visibility</p:attrName>
+                                        </p:attrNameLst>
+                                      </p:cBhvr>
+                                      <p:to>
+                                        <p:strVal val="visible"/>
+                                      </p:to>
+                                    </p:set>
+                                  </p:childTnLst>
+                                </p:cTn>
+                              </p:par>
+                              <p:par>
+                                <p:cTn id="62" presetID="1" presetClass="entr" presetSubtype="0" fill="hold" nodeType="withEffect">
+                                  <p:stCondLst>
+                                    <p:cond delay="0"/>
+                                  </p:stCondLst>
+                                  <p:childTnLst>
+                                    <p:set>
+                                      <p:cBhvr>
+                                        <p:cTn id="63" dur="1" fill="hold">
+                                          <p:stCondLst>
+                                            <p:cond delay="0"/>
+                                          </p:stCondLst>
+                                        </p:cTn>
+                                        <p:tgtEl>
+                                          <p:spTgt spid="20"/>
+                                        </p:tgtEl>
+                                        <p:attrNameLst>
+                                          <p:attrName>style.visibility</p:attrName>
+                                        </p:attrNameLst>
+                                      </p:cBhvr>
+                                      <p:to>
+                                        <p:strVal val="visible"/>
+                                      </p:to>
+                                    </p:set>
+                                  </p:childTnLst>
+                                </p:cTn>
+                              </p:par>
+                              <p:par>
+                                <p:cTn id="64" presetID="42" presetClass="path" presetSubtype="0" accel="50000" decel="50000" fill="hold" nodeType="withEffect">
+                                  <p:stCondLst>
+                                    <p:cond delay="0"/>
+                                  </p:stCondLst>
+                                  <p:childTnLst>
+                                    <p:animMotion origin="layout" path="M 3.33333E-6 2.77556E-17 L 0.03125 0.0787 " pathEditMode="relative" rAng="0" ptsTypes="AA">
+                                      <p:cBhvr>
+                                        <p:cTn id="65" dur="500" fill="hold"/>
+                                        <p:tgtEl>
+                                          <p:spTgt spid="20"/>
+                                        </p:tgtEl>
+                                        <p:attrNameLst>
+                                          <p:attrName>ppt_x</p:attrName>
+                                          <p:attrName>ppt_y</p:attrName>
+                                        </p:attrNameLst>
+                                      </p:cBhvr>
+                                      <p:rCtr x="1563" y="4005"/>
+                                    </p:animMotion>
+                                  </p:childTnLst>
+                                </p:cTn>
+                              </p:par>
+                              <p:par>
+                                <p:cTn id="66" presetID="42" presetClass="path" presetSubtype="0" accel="50000" decel="50000" fill="hold" nodeType="withEffect">
+                                  <p:stCondLst>
+                                    <p:cond delay="0"/>
+                                  </p:stCondLst>
+                                  <p:childTnLst>
+                                    <p:animMotion origin="layout" path="M 3.33333E-6 2.77556E-17 L 0.12291 0.075 " pathEditMode="relative" rAng="0" ptsTypes="AA">
+                                      <p:cBhvr>
+                                        <p:cTn id="67" dur="500" fill="hold"/>
+                                        <p:tgtEl>
+                                          <p:spTgt spid="17"/>
+                                        </p:tgtEl>
+                                        <p:attrNameLst>
+                                          <p:attrName>ppt_x</p:attrName>
+                                          <p:attrName>ppt_y</p:attrName>
+                                        </p:attrNameLst>
+                                      </p:cBhvr>
+                                      <p:rCtr x="6146" y="3750"/>
+                                    </p:animMotion>
+                                  </p:childTnLst>
+                                </p:cTn>
+                              </p:par>
+                            </p:childTnLst>
+                          </p:cTn>
+                        </p:par>
+                        <p:par>
+                          <p:cTn id="68" fill="hold">
+                            <p:stCondLst>
+                              <p:cond delay="5960"/>
+                            </p:stCondLst>
+                            <p:childTnLst>
+                              <p:par>
+                                <p:cTn id="69" presetID="53" presetClass="exit" presetSubtype="32" fill="hold" nodeType="afterEffect">
+                                  <p:stCondLst>
+                                    <p:cond delay="0"/>
+                                  </p:stCondLst>
+                                  <p:childTnLst>
+                                    <p:anim calcmode="lin" valueType="num">
+                                      <p:cBhvr>
+                                        <p:cTn id="70" dur="500"/>
+                                        <p:tgtEl>
+                                          <p:spTgt spid="14"/>
+                                        </p:tgtEl>
+                                        <p:attrNameLst>
+                                          <p:attrName>ppt_w</p:attrName>
+                                        </p:attrNameLst>
+                                      </p:cBhvr>
+                                      <p:tavLst>
+                                        <p:tav tm="0">
+                                          <p:val>
+                                            <p:strVal val="ppt_w"/>
+                                          </p:val>
+                                        </p:tav>
+                                        <p:tav tm="100000">
+                                          <p:val>
+                                            <p:fltVal val="0"/>
+                                          </p:val>
+                                        </p:tav>
+                                      </p:tavLst>
+                                    </p:anim>
+                                    <p:anim calcmode="lin" valueType="num">
+                                      <p:cBhvr>
+                                        <p:cTn id="71" dur="500"/>
+                                        <p:tgtEl>
+                                          <p:spTgt spid="14"/>
+                                        </p:tgtEl>
+                                        <p:attrNameLst>
+                                          <p:attrName>ppt_h</p:attrName>
+                                        </p:attrNameLst>
+                                      </p:cBhvr>
+                                      <p:tavLst>
+                                        <p:tav tm="0">
+                                          <p:val>
+                                            <p:strVal val="ppt_h"/>
+                                          </p:val>
+                                        </p:tav>
+                                        <p:tav tm="100000">
+                                          <p:val>
+                                            <p:fltVal val="0"/>
+                                          </p:val>
+                                        </p:tav>
+                                      </p:tavLst>
+                                    </p:anim>
+                                    <p:animEffect transition="out" filter="fade">
+                                      <p:cBhvr>
+                                        <p:cTn id="72" dur="500"/>
+                                        <p:tgtEl>
+                                          <p:spTgt spid="14"/>
+                                        </p:tgtEl>
+                                      </p:cBhvr>
+                                    </p:animEffect>
+                                    <p:set>
+                                      <p:cBhvr>
+                                        <p:cTn id="73" dur="1" fill="hold">
+                                          <p:stCondLst>
+                                            <p:cond delay="499"/>
+                                          </p:stCondLst>
+                                        </p:cTn>
+                                        <p:tgtEl>
+                                          <p:spTgt spid="14"/>
+                                        </p:tgtEl>
+                                        <p:attrNameLst>
+                                          <p:attrName>style.visibility</p:attrName>
+                                        </p:attrNameLst>
+                                      </p:cBhvr>
+                                      <p:to>
+                                        <p:strVal val="hidden"/>
+                                      </p:to>
+                                    </p:set>
+                                  </p:childTnLst>
+                                </p:cTn>
+                              </p:par>
+                              <p:par>
+                                <p:cTn id="74" presetID="42" presetClass="path" presetSubtype="0" accel="50000" decel="50000" fill="hold" nodeType="withEffect">
+                                  <p:stCondLst>
+                                    <p:cond delay="0"/>
+                                  </p:stCondLst>
+                                  <p:childTnLst>
+                                    <p:animMotion origin="layout" path="M 0.03125 0.0787 L 0.03125 0.39444 " pathEditMode="relative" rAng="0" ptsTypes="AA">
+                                      <p:cBhvr>
+                                        <p:cTn id="75" dur="500" fill="hold"/>
+                                        <p:tgtEl>
+                                          <p:spTgt spid="20"/>
+                                        </p:tgtEl>
+                                        <p:attrNameLst>
+                                          <p:attrName>ppt_x</p:attrName>
+                                          <p:attrName>ppt_y</p:attrName>
+                                        </p:attrNameLst>
+                                      </p:cBhvr>
+                                      <p:rCtr x="0" y="15787"/>
+                                    </p:animMotion>
+                                  </p:childTnLst>
+                                </p:cTn>
+                              </p:par>
+                              <p:par>
+                                <p:cTn id="76" presetID="42" presetClass="path" presetSubtype="0" accel="50000" decel="50000" fill="hold" nodeType="withEffect">
+                                  <p:stCondLst>
+                                    <p:cond delay="0"/>
+                                  </p:stCondLst>
+                                  <p:childTnLst>
+                                    <p:animMotion origin="layout" path="M 0.12257 0.07477 L 0.38194 0.3956 " pathEditMode="relative" rAng="0" ptsTypes="AA">
+                                      <p:cBhvr>
+                                        <p:cTn id="77" dur="500" fill="hold"/>
+                                        <p:tgtEl>
+                                          <p:spTgt spid="17"/>
+                                        </p:tgtEl>
+                                        <p:attrNameLst>
+                                          <p:attrName>ppt_x</p:attrName>
+                                          <p:attrName>ppt_y</p:attrName>
+                                        </p:attrNameLst>
+                                      </p:cBhvr>
+                                      <p:rCtr x="12969" y="16042"/>
+                                    </p:animMotion>
+                                  </p:childTnLst>
+                                </p:cTn>
+                              </p:par>
+                            </p:childTnLst>
+                          </p:cTn>
+                        </p:par>
+                        <p:par>
+                          <p:cTn id="78" fill="hold">
+                            <p:stCondLst>
+                              <p:cond delay="6460"/>
+                            </p:stCondLst>
+                            <p:childTnLst>
+                              <p:par>
+                                <p:cTn id="79" presetID="1" presetClass="exit" presetSubtype="0" fill="hold" nodeType="afterEffect">
+                                  <p:stCondLst>
+                                    <p:cond delay="0"/>
+                                  </p:stCondLst>
+                                  <p:childTnLst>
+                                    <p:set>
+                                      <p:cBhvr>
+                                        <p:cTn id="80" dur="1" fill="hold">
+                                          <p:stCondLst>
+                                            <p:cond delay="0"/>
+                                          </p:stCondLst>
+                                        </p:cTn>
+                                        <p:tgtEl>
+                                          <p:spTgt spid="20"/>
+                                        </p:tgtEl>
+                                        <p:attrNameLst>
+                                          <p:attrName>style.visibility</p:attrName>
+                                        </p:attrNameLst>
+                                      </p:cBhvr>
+                                      <p:to>
+                                        <p:strVal val="hidden"/>
+                                      </p:to>
+                                    </p:set>
+                                  </p:childTnLst>
+                                </p:cTn>
+                              </p:par>
+                              <p:par>
+                                <p:cTn id="81" presetID="1" presetClass="exit" presetSubtype="0" fill="hold" nodeType="withEffect">
+                                  <p:stCondLst>
+                                    <p:cond delay="0"/>
+                                  </p:stCondLst>
+                                  <p:childTnLst>
+                                    <p:set>
+                                      <p:cBhvr>
+                                        <p:cTn id="82" dur="1" fill="hold">
+                                          <p:stCondLst>
+                                            <p:cond delay="0"/>
+                                          </p:stCondLst>
+                                        </p:cTn>
+                                        <p:tgtEl>
+                                          <p:spTgt spid="17"/>
+                                        </p:tgtEl>
+                                        <p:attrNameLst>
+                                          <p:attrName>style.visibility</p:attrName>
+                                        </p:attrNameLst>
+                                      </p:cBhvr>
+                                      <p:to>
+                                        <p:strVal val="hidden"/>
+                                      </p:to>
+                                    </p:set>
+                                  </p:childTnLst>
+                                </p:cTn>
+                              </p:par>
+                              <p:par>
+                                <p:cTn id="83" presetID="1" presetClass="entr" presetSubtype="0" fill="hold" nodeType="withEffect">
+                                  <p:stCondLst>
+                                    <p:cond delay="0"/>
+                                  </p:stCondLst>
+                                  <p:childTnLst>
+                                    <p:set>
+                                      <p:cBhvr>
+                                        <p:cTn id="84" dur="1" fill="hold">
+                                          <p:stCondLst>
+                                            <p:cond delay="0"/>
+                                          </p:stCondLst>
+                                        </p:cTn>
+                                        <p:tgtEl>
+                                          <p:spTgt spid="21"/>
+                                        </p:tgtEl>
+                                        <p:attrNameLst>
+                                          <p:attrName>style.visibility</p:attrName>
+                                        </p:attrNameLst>
+                                      </p:cBhvr>
+                                      <p:to>
+                                        <p:strVal val="visible"/>
+                                      </p:to>
+                                    </p:set>
+                                  </p:childTnLst>
+                                </p:cTn>
+                              </p:par>
+                              <p:par>
+                                <p:cTn id="85" presetID="1" presetClass="entr" presetSubtype="0" fill="hold" nodeType="withEffect">
+                                  <p:stCondLst>
+                                    <p:cond delay="0"/>
+                                  </p:stCondLst>
+                                  <p:childTnLst>
+                                    <p:set>
+                                      <p:cBhvr>
+                                        <p:cTn id="86" dur="1" fill="hold">
+                                          <p:stCondLst>
+                                            <p:cond delay="0"/>
+                                          </p:stCondLst>
+                                        </p:cTn>
+                                        <p:tgtEl>
+                                          <p:spTgt spid="22"/>
+                                        </p:tgtEl>
+                                        <p:attrNameLst>
+                                          <p:attrName>style.visibility</p:attrName>
+                                        </p:attrNameLst>
+                                      </p:cBhvr>
+                                      <p:to>
+                                        <p:strVal val="visible"/>
+                                      </p:to>
+                                    </p:set>
+                                  </p:childTnLst>
+                                </p:cTn>
+                              </p:par>
+                              <p:par>
+                                <p:cTn id="87" presetID="1" presetClass="entr" presetSubtype="0" fill="hold" nodeType="withEffect">
+                                  <p:stCondLst>
+                                    <p:cond delay="0"/>
+                                  </p:stCondLst>
+                                  <p:childTnLst>
+                                    <p:set>
+                                      <p:cBhvr>
+                                        <p:cTn id="88" dur="1" fill="hold">
+                                          <p:stCondLst>
+                                            <p:cond delay="0"/>
+                                          </p:stCondLst>
+                                        </p:cTn>
+                                        <p:tgtEl>
+                                          <p:spTgt spid="23"/>
+                                        </p:tgtEl>
+                                        <p:attrNameLst>
+                                          <p:attrName>style.visibility</p:attrName>
+                                        </p:attrNameLst>
+                                      </p:cBhvr>
+                                      <p:to>
+                                        <p:strVal val="visible"/>
+                                      </p:to>
+                                    </p:set>
+                                  </p:childTnLst>
+                                </p:cTn>
+                              </p:par>
+                              <p:par>
+                                <p:cTn id="89" presetID="1" presetClass="entr" presetSubtype="0" fill="hold" nodeType="withEffect">
+                                  <p:stCondLst>
+                                    <p:cond delay="0"/>
+                                  </p:stCondLst>
+                                  <p:childTnLst>
+                                    <p:set>
+                                      <p:cBhvr>
+                                        <p:cTn id="90" dur="1" fill="hold">
+                                          <p:stCondLst>
+                                            <p:cond delay="0"/>
+                                          </p:stCondLst>
+                                        </p:cTn>
+                                        <p:tgtEl>
+                                          <p:spTgt spid="24"/>
+                                        </p:tgtEl>
+                                        <p:attrNameLst>
+                                          <p:attrName>style.visibility</p:attrName>
+                                        </p:attrNameLst>
+                                      </p:cBhvr>
+                                      <p:to>
+                                        <p:strVal val="visible"/>
+                                      </p:to>
+                                    </p:set>
+                                  </p:childTnLst>
+                                </p:cTn>
+                              </p:par>
+                            </p:childTnLst>
+                          </p:cTn>
+                        </p:par>
+                        <p:par>
+                          <p:cTn id="91" fill="hold">
+                            <p:stCondLst>
+                              <p:cond delay="6460"/>
+                            </p:stCondLst>
+                            <p:childTnLst>
+                              <p:par>
+                                <p:cTn id="92" presetID="42" presetClass="path" presetSubtype="0" accel="50000" decel="50000" fill="hold" nodeType="afterEffect">
+                                  <p:stCondLst>
+                                    <p:cond delay="0"/>
+                                  </p:stCondLst>
+                                  <p:childTnLst>
+                                    <p:animMotion origin="layout" path="M -2.22222E-6 -1.48148E-6 L -0.09271 0.13333 " pathEditMode="relative" rAng="0" ptsTypes="AA">
+                                      <p:cBhvr>
+                                        <p:cTn id="93" dur="150" fill="hold"/>
+                                        <p:tgtEl>
+                                          <p:spTgt spid="21"/>
+                                        </p:tgtEl>
+                                        <p:attrNameLst>
+                                          <p:attrName>ppt_x</p:attrName>
+                                          <p:attrName>ppt_y</p:attrName>
+                                        </p:attrNameLst>
+                                      </p:cBhvr>
+                                      <p:rCtr x="-4635" y="6667"/>
+                                    </p:animMotion>
+                                  </p:childTnLst>
+                                </p:cTn>
+                              </p:par>
+                              <p:par>
+                                <p:cTn id="94" presetID="42" presetClass="path" presetSubtype="0" accel="50000" decel="50000" fill="hold" nodeType="withEffect">
+                                  <p:stCondLst>
+                                    <p:cond delay="0"/>
+                                  </p:stCondLst>
+                                  <p:childTnLst>
+                                    <p:animMotion origin="layout" path="M -2.22222E-6 -1.48148E-6 L -0.00139 0.13333 " pathEditMode="relative" rAng="0" ptsTypes="AA">
+                                      <p:cBhvr>
+                                        <p:cTn id="95" dur="150" fill="hold"/>
+                                        <p:tgtEl>
+                                          <p:spTgt spid="22"/>
+                                        </p:tgtEl>
+                                        <p:attrNameLst>
+                                          <p:attrName>ppt_x</p:attrName>
+                                          <p:attrName>ppt_y</p:attrName>
+                                        </p:attrNameLst>
+                                      </p:cBhvr>
+                                      <p:rCtr x="-69" y="6667"/>
+                                    </p:animMotion>
+                                  </p:childTnLst>
+                                </p:cTn>
+                              </p:par>
+                              <p:par>
+                                <p:cTn id="96" presetID="42" presetClass="path" presetSubtype="0" accel="50000" decel="50000" fill="hold" nodeType="withEffect">
+                                  <p:stCondLst>
+                                    <p:cond delay="0"/>
+                                  </p:stCondLst>
+                                  <p:childTnLst>
+                                    <p:animMotion origin="layout" path="M 2.22222E-6 -1.48148E-6 L -0.11146 0.13333 " pathEditMode="relative" rAng="0" ptsTypes="AA">
+                                      <p:cBhvr>
+                                        <p:cTn id="97" dur="150" fill="hold"/>
+                                        <p:tgtEl>
+                                          <p:spTgt spid="23"/>
+                                        </p:tgtEl>
+                                        <p:attrNameLst>
+                                          <p:attrName>ppt_x</p:attrName>
+                                          <p:attrName>ppt_y</p:attrName>
+                                        </p:attrNameLst>
+                                      </p:cBhvr>
+                                      <p:rCtr x="-5573" y="6667"/>
+                                    </p:animMotion>
+                                  </p:childTnLst>
+                                </p:cTn>
+                              </p:par>
+                              <p:par>
+                                <p:cTn id="98" presetID="42" presetClass="path" presetSubtype="0" accel="50000" decel="50000" fill="hold" nodeType="withEffect">
+                                  <p:stCondLst>
+                                    <p:cond delay="0"/>
+                                  </p:stCondLst>
+                                  <p:childTnLst>
+                                    <p:animMotion origin="layout" path="M 2.22222E-6 -1.48148E-6 L -0.01823 0.13333 " pathEditMode="relative" rAng="0" ptsTypes="AA">
+                                      <p:cBhvr>
+                                        <p:cTn id="99" dur="150" fill="hold"/>
+                                        <p:tgtEl>
+                                          <p:spTgt spid="24"/>
+                                        </p:tgtEl>
+                                        <p:attrNameLst>
+                                          <p:attrName>ppt_x</p:attrName>
+                                          <p:attrName>ppt_y</p:attrName>
+                                        </p:attrNameLst>
+                                      </p:cBhvr>
+                                      <p:rCtr x="-920" y="6667"/>
+                                    </p:animMotion>
+                                  </p:childTnLst>
+                                </p:cTn>
+                              </p:par>
+                            </p:childTnLst>
+                          </p:cTn>
+                        </p:par>
+                        <p:par>
+                          <p:cTn id="100" fill="hold">
+                            <p:stCondLst>
+                              <p:cond delay="6610"/>
+                            </p:stCondLst>
+                            <p:childTnLst>
+                              <p:par>
+                                <p:cTn id="101" presetID="53" presetClass="entr" presetSubtype="16" fill="hold" nodeType="afterEffect">
+                                  <p:stCondLst>
+                                    <p:cond delay="0"/>
+                                  </p:stCondLst>
+                                  <p:childTnLst>
+                                    <p:set>
+                                      <p:cBhvr>
+                                        <p:cTn id="102" dur="1" fill="hold">
+                                          <p:stCondLst>
+                                            <p:cond delay="0"/>
+                                          </p:stCondLst>
+                                        </p:cTn>
+                                        <p:tgtEl>
+                                          <p:spTgt spid="15"/>
+                                        </p:tgtEl>
+                                        <p:attrNameLst>
+                                          <p:attrName>style.visibility</p:attrName>
+                                        </p:attrNameLst>
+                                      </p:cBhvr>
+                                      <p:to>
+                                        <p:strVal val="visible"/>
+                                      </p:to>
+                                    </p:set>
+                                    <p:anim calcmode="lin" valueType="num">
+                                      <p:cBhvr>
+                                        <p:cTn id="103" dur="500" fill="hold"/>
+                                        <p:tgtEl>
+                                          <p:spTgt spid="15"/>
+                                        </p:tgtEl>
+                                        <p:attrNameLst>
+                                          <p:attrName>ppt_w</p:attrName>
+                                        </p:attrNameLst>
+                                      </p:cBhvr>
+                                      <p:tavLst>
+                                        <p:tav tm="0">
+                                          <p:val>
+                                            <p:fltVal val="0"/>
+                                          </p:val>
+                                        </p:tav>
+                                        <p:tav tm="100000">
+                                          <p:val>
+                                            <p:strVal val="#ppt_w"/>
+                                          </p:val>
+                                        </p:tav>
+                                      </p:tavLst>
+                                    </p:anim>
+                                    <p:anim calcmode="lin" valueType="num">
+                                      <p:cBhvr>
+                                        <p:cTn id="104" dur="500" fill="hold"/>
+                                        <p:tgtEl>
+                                          <p:spTgt spid="15"/>
+                                        </p:tgtEl>
+                                        <p:attrNameLst>
+                                          <p:attrName>ppt_h</p:attrName>
+                                        </p:attrNameLst>
+                                      </p:cBhvr>
+                                      <p:tavLst>
+                                        <p:tav tm="0">
+                                          <p:val>
+                                            <p:fltVal val="0"/>
+                                          </p:val>
+                                        </p:tav>
+                                        <p:tav tm="100000">
+                                          <p:val>
+                                            <p:strVal val="#ppt_h"/>
+                                          </p:val>
+                                        </p:tav>
+                                      </p:tavLst>
+                                    </p:anim>
+                                    <p:animEffect transition="in" filter="fade">
+                                      <p:cBhvr>
+                                        <p:cTn id="105" dur="500"/>
+                                        <p:tgtEl>
+                                          <p:spTgt spid="15"/>
+                                        </p:tgtEl>
+                                      </p:cBhvr>
+                                    </p:animEffect>
+                                  </p:childTnLst>
+                                </p:cTn>
+                              </p:par>
+                              <p:par>
+                                <p:cTn id="106" presetID="53" presetClass="entr" presetSubtype="16" fill="hold" nodeType="withEffect">
+                                  <p:stCondLst>
+                                    <p:cond delay="0"/>
+                                  </p:stCondLst>
+                                  <p:childTnLst>
+                                    <p:set>
+                                      <p:cBhvr>
+                                        <p:cTn id="107" dur="1" fill="hold">
+                                          <p:stCondLst>
+                                            <p:cond delay="0"/>
+                                          </p:stCondLst>
+                                        </p:cTn>
+                                        <p:tgtEl>
+                                          <p:spTgt spid="25"/>
+                                        </p:tgtEl>
+                                        <p:attrNameLst>
+                                          <p:attrName>style.visibility</p:attrName>
+                                        </p:attrNameLst>
+                                      </p:cBhvr>
+                                      <p:to>
+                                        <p:strVal val="visible"/>
+                                      </p:to>
+                                    </p:set>
+                                    <p:anim calcmode="lin" valueType="num">
+                                      <p:cBhvr>
+                                        <p:cTn id="108" dur="500" fill="hold"/>
+                                        <p:tgtEl>
+                                          <p:spTgt spid="25"/>
+                                        </p:tgtEl>
+                                        <p:attrNameLst>
+                                          <p:attrName>ppt_w</p:attrName>
+                                        </p:attrNameLst>
+                                      </p:cBhvr>
+                                      <p:tavLst>
+                                        <p:tav tm="0">
+                                          <p:val>
+                                            <p:fltVal val="0"/>
+                                          </p:val>
+                                        </p:tav>
+                                        <p:tav tm="100000">
+                                          <p:val>
+                                            <p:strVal val="#ppt_w"/>
+                                          </p:val>
+                                        </p:tav>
+                                      </p:tavLst>
+                                    </p:anim>
+                                    <p:anim calcmode="lin" valueType="num">
+                                      <p:cBhvr>
+                                        <p:cTn id="109" dur="500" fill="hold"/>
+                                        <p:tgtEl>
+                                          <p:spTgt spid="25"/>
+                                        </p:tgtEl>
+                                        <p:attrNameLst>
+                                          <p:attrName>ppt_h</p:attrName>
+                                        </p:attrNameLst>
+                                      </p:cBhvr>
+                                      <p:tavLst>
+                                        <p:tav tm="0">
+                                          <p:val>
+                                            <p:fltVal val="0"/>
+                                          </p:val>
+                                        </p:tav>
+                                        <p:tav tm="100000">
+                                          <p:val>
+                                            <p:strVal val="#ppt_h"/>
+                                          </p:val>
+                                        </p:tav>
+                                      </p:tavLst>
+                                    </p:anim>
+                                    <p:animEffect transition="in" filter="fade">
+                                      <p:cBhvr>
+                                        <p:cTn id="110" dur="500"/>
+                                        <p:tgtEl>
+                                          <p:spTgt spid="25"/>
+                                        </p:tgtEl>
+                                      </p:cBhvr>
+                                    </p:animEffect>
+                                  </p:childTnLst>
+                                </p:cTn>
+                              </p:par>
+                              <p:par>
+                                <p:cTn id="111" presetID="53" presetClass="entr" presetSubtype="16" fill="hold" nodeType="withEffect">
+                                  <p:stCondLst>
+                                    <p:cond delay="0"/>
+                                  </p:stCondLst>
+                                  <p:childTnLst>
+                                    <p:set>
+                                      <p:cBhvr>
+                                        <p:cTn id="112" dur="1" fill="hold">
+                                          <p:stCondLst>
+                                            <p:cond delay="0"/>
+                                          </p:stCondLst>
+                                        </p:cTn>
+                                        <p:tgtEl>
+                                          <p:spTgt spid="26"/>
+                                        </p:tgtEl>
+                                        <p:attrNameLst>
+                                          <p:attrName>style.visibility</p:attrName>
+                                        </p:attrNameLst>
+                                      </p:cBhvr>
+                                      <p:to>
+                                        <p:strVal val="visible"/>
+                                      </p:to>
+                                    </p:set>
+                                    <p:anim calcmode="lin" valueType="num">
+                                      <p:cBhvr>
+                                        <p:cTn id="113" dur="500" fill="hold"/>
+                                        <p:tgtEl>
+                                          <p:spTgt spid="26"/>
+                                        </p:tgtEl>
+                                        <p:attrNameLst>
+                                          <p:attrName>ppt_w</p:attrName>
+                                        </p:attrNameLst>
+                                      </p:cBhvr>
+                                      <p:tavLst>
+                                        <p:tav tm="0">
+                                          <p:val>
+                                            <p:fltVal val="0"/>
+                                          </p:val>
+                                        </p:tav>
+                                        <p:tav tm="100000">
+                                          <p:val>
+                                            <p:strVal val="#ppt_w"/>
+                                          </p:val>
+                                        </p:tav>
+                                      </p:tavLst>
+                                    </p:anim>
+                                    <p:anim calcmode="lin" valueType="num">
+                                      <p:cBhvr>
+                                        <p:cTn id="114" dur="500" fill="hold"/>
+                                        <p:tgtEl>
+                                          <p:spTgt spid="26"/>
+                                        </p:tgtEl>
+                                        <p:attrNameLst>
+                                          <p:attrName>ppt_h</p:attrName>
+                                        </p:attrNameLst>
+                                      </p:cBhvr>
+                                      <p:tavLst>
+                                        <p:tav tm="0">
+                                          <p:val>
+                                            <p:fltVal val="0"/>
+                                          </p:val>
+                                        </p:tav>
+                                        <p:tav tm="100000">
+                                          <p:val>
+                                            <p:strVal val="#ppt_h"/>
+                                          </p:val>
+                                        </p:tav>
+                                      </p:tavLst>
+                                    </p:anim>
+                                    <p:animEffect transition="in" filter="fade">
+                                      <p:cBhvr>
+                                        <p:cTn id="115" dur="500"/>
+                                        <p:tgtEl>
+                                          <p:spTgt spid="26"/>
+                                        </p:tgtEl>
+                                      </p:cBhvr>
+                                    </p:animEffect>
+                                  </p:childTnLst>
+                                </p:cTn>
+                              </p:par>
+                              <p:par>
+                                <p:cTn id="116" presetID="53" presetClass="entr" presetSubtype="16" fill="hold" nodeType="withEffect">
+                                  <p:stCondLst>
+                                    <p:cond delay="0"/>
+                                  </p:stCondLst>
+                                  <p:childTnLst>
+                                    <p:set>
+                                      <p:cBhvr>
+                                        <p:cTn id="117" dur="1" fill="hold">
+                                          <p:stCondLst>
+                                            <p:cond delay="0"/>
+                                          </p:stCondLst>
+                                        </p:cTn>
+                                        <p:tgtEl>
+                                          <p:spTgt spid="27"/>
+                                        </p:tgtEl>
+                                        <p:attrNameLst>
+                                          <p:attrName>style.visibility</p:attrName>
+                                        </p:attrNameLst>
+                                      </p:cBhvr>
+                                      <p:to>
+                                        <p:strVal val="visible"/>
+                                      </p:to>
+                                    </p:set>
+                                    <p:anim calcmode="lin" valueType="num">
+                                      <p:cBhvr>
+                                        <p:cTn id="118" dur="500" fill="hold"/>
+                                        <p:tgtEl>
+                                          <p:spTgt spid="27"/>
+                                        </p:tgtEl>
+                                        <p:attrNameLst>
+                                          <p:attrName>ppt_w</p:attrName>
+                                        </p:attrNameLst>
+                                      </p:cBhvr>
+                                      <p:tavLst>
+                                        <p:tav tm="0">
+                                          <p:val>
+                                            <p:fltVal val="0"/>
+                                          </p:val>
+                                        </p:tav>
+                                        <p:tav tm="100000">
+                                          <p:val>
+                                            <p:strVal val="#ppt_w"/>
+                                          </p:val>
+                                        </p:tav>
+                                      </p:tavLst>
+                                    </p:anim>
+                                    <p:anim calcmode="lin" valueType="num">
+                                      <p:cBhvr>
+                                        <p:cTn id="119" dur="500" fill="hold"/>
+                                        <p:tgtEl>
+                                          <p:spTgt spid="27"/>
+                                        </p:tgtEl>
+                                        <p:attrNameLst>
+                                          <p:attrName>ppt_h</p:attrName>
+                                        </p:attrNameLst>
+                                      </p:cBhvr>
+                                      <p:tavLst>
+                                        <p:tav tm="0">
+                                          <p:val>
+                                            <p:fltVal val="0"/>
+                                          </p:val>
+                                        </p:tav>
+                                        <p:tav tm="100000">
+                                          <p:val>
+                                            <p:strVal val="#ppt_h"/>
+                                          </p:val>
+                                        </p:tav>
+                                      </p:tavLst>
+                                    </p:anim>
+                                    <p:animEffect transition="in" filter="fade">
+                                      <p:cBhvr>
+                                        <p:cTn id="120" dur="500"/>
+                                        <p:tgtEl>
+                                          <p:spTgt spid="27"/>
+                                        </p:tgtEl>
+                                      </p:cBhvr>
+                                    </p:animEffect>
+                                  </p:childTnLst>
+                                </p:cTn>
+                              </p:par>
+                            </p:childTnLst>
+                          </p:cTn>
+                        </p:par>
+                        <p:par>
+                          <p:cTn id="121" fill="hold">
+                            <p:stCondLst>
+                              <p:cond delay="7110"/>
+                            </p:stCondLst>
+                            <p:childTnLst>
+                              <p:par>
+                                <p:cTn id="122" presetID="53" presetClass="exit" presetSubtype="32" fill="hold" nodeType="afterEffect">
+                                  <p:stCondLst>
+                                    <p:cond delay="0"/>
+                                  </p:stCondLst>
+                                  <p:childTnLst>
+                                    <p:anim calcmode="lin" valueType="num">
+                                      <p:cBhvr>
+                                        <p:cTn id="123" dur="500"/>
+                                        <p:tgtEl>
+                                          <p:spTgt spid="25"/>
+                                        </p:tgtEl>
+                                        <p:attrNameLst>
+                                          <p:attrName>ppt_w</p:attrName>
+                                        </p:attrNameLst>
+                                      </p:cBhvr>
+                                      <p:tavLst>
+                                        <p:tav tm="0">
+                                          <p:val>
+                                            <p:strVal val="ppt_w"/>
+                                          </p:val>
+                                        </p:tav>
+                                        <p:tav tm="100000">
+                                          <p:val>
+                                            <p:fltVal val="0"/>
+                                          </p:val>
+                                        </p:tav>
+                                      </p:tavLst>
+                                    </p:anim>
+                                    <p:anim calcmode="lin" valueType="num">
+                                      <p:cBhvr>
+                                        <p:cTn id="124" dur="500"/>
+                                        <p:tgtEl>
+                                          <p:spTgt spid="25"/>
+                                        </p:tgtEl>
+                                        <p:attrNameLst>
+                                          <p:attrName>ppt_h</p:attrName>
+                                        </p:attrNameLst>
+                                      </p:cBhvr>
+                                      <p:tavLst>
+                                        <p:tav tm="0">
+                                          <p:val>
+                                            <p:strVal val="ppt_h"/>
+                                          </p:val>
+                                        </p:tav>
+                                        <p:tav tm="100000">
+                                          <p:val>
+                                            <p:fltVal val="0"/>
+                                          </p:val>
+                                        </p:tav>
+                                      </p:tavLst>
+                                    </p:anim>
+                                    <p:animEffect transition="out" filter="fade">
+                                      <p:cBhvr>
+                                        <p:cTn id="125" dur="500"/>
+                                        <p:tgtEl>
+                                          <p:spTgt spid="25"/>
+                                        </p:tgtEl>
+                                      </p:cBhvr>
+                                    </p:animEffect>
+                                    <p:set>
+                                      <p:cBhvr>
+                                        <p:cTn id="126" dur="1" fill="hold">
+                                          <p:stCondLst>
+                                            <p:cond delay="499"/>
+                                          </p:stCondLst>
+                                        </p:cTn>
+                                        <p:tgtEl>
+                                          <p:spTgt spid="25"/>
+                                        </p:tgtEl>
+                                        <p:attrNameLst>
+                                          <p:attrName>style.visibility</p:attrName>
+                                        </p:attrNameLst>
+                                      </p:cBhvr>
+                                      <p:to>
+                                        <p:strVal val="hidden"/>
+                                      </p:to>
+                                    </p:set>
+                                  </p:childTnLst>
+                                </p:cTn>
+                              </p:par>
+                              <p:par>
+                                <p:cTn id="127" presetID="53" presetClass="exit" presetSubtype="32" fill="hold" nodeType="withEffect">
+                                  <p:stCondLst>
+                                    <p:cond delay="0"/>
+                                  </p:stCondLst>
+                                  <p:childTnLst>
+                                    <p:anim calcmode="lin" valueType="num">
+                                      <p:cBhvr>
+                                        <p:cTn id="128" dur="500"/>
+                                        <p:tgtEl>
+                                          <p:spTgt spid="15"/>
+                                        </p:tgtEl>
+                                        <p:attrNameLst>
+                                          <p:attrName>ppt_w</p:attrName>
+                                        </p:attrNameLst>
+                                      </p:cBhvr>
+                                      <p:tavLst>
+                                        <p:tav tm="0">
+                                          <p:val>
+                                            <p:strVal val="ppt_w"/>
+                                          </p:val>
+                                        </p:tav>
+                                        <p:tav tm="100000">
+                                          <p:val>
+                                            <p:fltVal val="0"/>
+                                          </p:val>
+                                        </p:tav>
+                                      </p:tavLst>
+                                    </p:anim>
+                                    <p:anim calcmode="lin" valueType="num">
+                                      <p:cBhvr>
+                                        <p:cTn id="129" dur="500"/>
+                                        <p:tgtEl>
+                                          <p:spTgt spid="15"/>
+                                        </p:tgtEl>
+                                        <p:attrNameLst>
+                                          <p:attrName>ppt_h</p:attrName>
+                                        </p:attrNameLst>
+                                      </p:cBhvr>
+                                      <p:tavLst>
+                                        <p:tav tm="0">
+                                          <p:val>
+                                            <p:strVal val="ppt_h"/>
+                                          </p:val>
+                                        </p:tav>
+                                        <p:tav tm="100000">
+                                          <p:val>
+                                            <p:fltVal val="0"/>
+                                          </p:val>
+                                        </p:tav>
+                                      </p:tavLst>
+                                    </p:anim>
+                                    <p:animEffect transition="out" filter="fade">
+                                      <p:cBhvr>
+                                        <p:cTn id="130" dur="500"/>
+                                        <p:tgtEl>
+                                          <p:spTgt spid="15"/>
+                                        </p:tgtEl>
+                                      </p:cBhvr>
+                                    </p:animEffect>
+                                    <p:set>
+                                      <p:cBhvr>
+                                        <p:cTn id="131" dur="1" fill="hold">
+                                          <p:stCondLst>
+                                            <p:cond delay="499"/>
+                                          </p:stCondLst>
+                                        </p:cTn>
+                                        <p:tgtEl>
+                                          <p:spTgt spid="15"/>
+                                        </p:tgtEl>
+                                        <p:attrNameLst>
+                                          <p:attrName>style.visibility</p:attrName>
+                                        </p:attrNameLst>
+                                      </p:cBhvr>
+                                      <p:to>
+                                        <p:strVal val="hidden"/>
+                                      </p:to>
+                                    </p:set>
+                                  </p:childTnLst>
+                                </p:cTn>
+                              </p:par>
+                              <p:par>
+                                <p:cTn id="132" presetID="53" presetClass="exit" presetSubtype="32" fill="hold" nodeType="withEffect">
+                                  <p:stCondLst>
+                                    <p:cond delay="0"/>
+                                  </p:stCondLst>
+                                  <p:childTnLst>
+                                    <p:anim calcmode="lin" valueType="num">
+                                      <p:cBhvr>
+                                        <p:cTn id="133" dur="500"/>
+                                        <p:tgtEl>
+                                          <p:spTgt spid="26"/>
+                                        </p:tgtEl>
+                                        <p:attrNameLst>
+                                          <p:attrName>ppt_w</p:attrName>
+                                        </p:attrNameLst>
+                                      </p:cBhvr>
+                                      <p:tavLst>
+                                        <p:tav tm="0">
+                                          <p:val>
+                                            <p:strVal val="ppt_w"/>
+                                          </p:val>
+                                        </p:tav>
+                                        <p:tav tm="100000">
+                                          <p:val>
+                                            <p:fltVal val="0"/>
+                                          </p:val>
+                                        </p:tav>
+                                      </p:tavLst>
+                                    </p:anim>
+                                    <p:anim calcmode="lin" valueType="num">
+                                      <p:cBhvr>
+                                        <p:cTn id="134" dur="500"/>
+                                        <p:tgtEl>
+                                          <p:spTgt spid="26"/>
+                                        </p:tgtEl>
+                                        <p:attrNameLst>
+                                          <p:attrName>ppt_h</p:attrName>
+                                        </p:attrNameLst>
+                                      </p:cBhvr>
+                                      <p:tavLst>
+                                        <p:tav tm="0">
+                                          <p:val>
+                                            <p:strVal val="ppt_h"/>
+                                          </p:val>
+                                        </p:tav>
+                                        <p:tav tm="100000">
+                                          <p:val>
+                                            <p:fltVal val="0"/>
+                                          </p:val>
+                                        </p:tav>
+                                      </p:tavLst>
+                                    </p:anim>
+                                    <p:animEffect transition="out" filter="fade">
+                                      <p:cBhvr>
+                                        <p:cTn id="135" dur="500"/>
+                                        <p:tgtEl>
+                                          <p:spTgt spid="26"/>
+                                        </p:tgtEl>
+                                      </p:cBhvr>
+                                    </p:animEffect>
+                                    <p:set>
+                                      <p:cBhvr>
+                                        <p:cTn id="136" dur="1" fill="hold">
+                                          <p:stCondLst>
+                                            <p:cond delay="499"/>
+                                          </p:stCondLst>
+                                        </p:cTn>
+                                        <p:tgtEl>
+                                          <p:spTgt spid="26"/>
+                                        </p:tgtEl>
+                                        <p:attrNameLst>
+                                          <p:attrName>style.visibility</p:attrName>
+                                        </p:attrNameLst>
+                                      </p:cBhvr>
+                                      <p:to>
+                                        <p:strVal val="hidden"/>
+                                      </p:to>
+                                    </p:set>
+                                  </p:childTnLst>
+                                </p:cTn>
+                              </p:par>
+                              <p:par>
+                                <p:cTn id="137" presetID="53" presetClass="exit" presetSubtype="32" fill="hold" nodeType="withEffect">
+                                  <p:stCondLst>
+                                    <p:cond delay="0"/>
+                                  </p:stCondLst>
+                                  <p:childTnLst>
+                                    <p:anim calcmode="lin" valueType="num">
+                                      <p:cBhvr>
+                                        <p:cTn id="138" dur="500"/>
+                                        <p:tgtEl>
+                                          <p:spTgt spid="27"/>
+                                        </p:tgtEl>
+                                        <p:attrNameLst>
+                                          <p:attrName>ppt_w</p:attrName>
+                                        </p:attrNameLst>
+                                      </p:cBhvr>
+                                      <p:tavLst>
+                                        <p:tav tm="0">
+                                          <p:val>
+                                            <p:strVal val="ppt_w"/>
+                                          </p:val>
+                                        </p:tav>
+                                        <p:tav tm="100000">
+                                          <p:val>
+                                            <p:fltVal val="0"/>
+                                          </p:val>
+                                        </p:tav>
+                                      </p:tavLst>
+                                    </p:anim>
+                                    <p:anim calcmode="lin" valueType="num">
+                                      <p:cBhvr>
+                                        <p:cTn id="139" dur="500"/>
+                                        <p:tgtEl>
+                                          <p:spTgt spid="27"/>
+                                        </p:tgtEl>
+                                        <p:attrNameLst>
+                                          <p:attrName>ppt_h</p:attrName>
+                                        </p:attrNameLst>
+                                      </p:cBhvr>
+                                      <p:tavLst>
+                                        <p:tav tm="0">
+                                          <p:val>
+                                            <p:strVal val="ppt_h"/>
+                                          </p:val>
+                                        </p:tav>
+                                        <p:tav tm="100000">
+                                          <p:val>
+                                            <p:fltVal val="0"/>
+                                          </p:val>
+                                        </p:tav>
+                                      </p:tavLst>
+                                    </p:anim>
+                                    <p:animEffect transition="out" filter="fade">
+                                      <p:cBhvr>
+                                        <p:cTn id="140" dur="500"/>
+                                        <p:tgtEl>
+                                          <p:spTgt spid="27"/>
+                                        </p:tgtEl>
+                                      </p:cBhvr>
+                                    </p:animEffect>
+                                    <p:set>
+                                      <p:cBhvr>
+                                        <p:cTn id="141" dur="1" fill="hold">
+                                          <p:stCondLst>
+                                            <p:cond delay="499"/>
+                                          </p:stCondLst>
+                                        </p:cTn>
+                                        <p:tgtEl>
+                                          <p:spTgt spid="27"/>
+                                        </p:tgtEl>
+                                        <p:attrNameLst>
+                                          <p:attrName>style.visibility</p:attrName>
+                                        </p:attrNameLst>
+                                      </p:cBhvr>
+                                      <p:to>
+                                        <p:strVal val="hidden"/>
+                                      </p:to>
+                                    </p:set>
+                                  </p:childTnLst>
+                                </p:cTn>
+                              </p:par>
+                              <p:par>
+                                <p:cTn id="142" presetID="53" presetClass="exit" presetSubtype="32" fill="hold" nodeType="withEffect">
+                                  <p:stCondLst>
+                                    <p:cond delay="0"/>
+                                  </p:stCondLst>
+                                  <p:childTnLst>
+                                    <p:anim calcmode="lin" valueType="num">
+                                      <p:cBhvr>
+                                        <p:cTn id="143" dur="500"/>
+                                        <p:tgtEl>
+                                          <p:spTgt spid="21"/>
+                                        </p:tgtEl>
+                                        <p:attrNameLst>
+                                          <p:attrName>ppt_w</p:attrName>
+                                        </p:attrNameLst>
+                                      </p:cBhvr>
+                                      <p:tavLst>
+                                        <p:tav tm="0">
+                                          <p:val>
+                                            <p:strVal val="ppt_w"/>
+                                          </p:val>
+                                        </p:tav>
+                                        <p:tav tm="100000">
+                                          <p:val>
+                                            <p:fltVal val="0"/>
+                                          </p:val>
+                                        </p:tav>
+                                      </p:tavLst>
+                                    </p:anim>
+                                    <p:anim calcmode="lin" valueType="num">
+                                      <p:cBhvr>
+                                        <p:cTn id="144" dur="500"/>
+                                        <p:tgtEl>
+                                          <p:spTgt spid="21"/>
+                                        </p:tgtEl>
+                                        <p:attrNameLst>
+                                          <p:attrName>ppt_h</p:attrName>
+                                        </p:attrNameLst>
+                                      </p:cBhvr>
+                                      <p:tavLst>
+                                        <p:tav tm="0">
+                                          <p:val>
+                                            <p:strVal val="ppt_h"/>
+                                          </p:val>
+                                        </p:tav>
+                                        <p:tav tm="100000">
+                                          <p:val>
+                                            <p:fltVal val="0"/>
+                                          </p:val>
+                                        </p:tav>
+                                      </p:tavLst>
+                                    </p:anim>
+                                    <p:animEffect transition="out" filter="fade">
+                                      <p:cBhvr>
+                                        <p:cTn id="145" dur="500"/>
+                                        <p:tgtEl>
+                                          <p:spTgt spid="21"/>
+                                        </p:tgtEl>
+                                      </p:cBhvr>
+                                    </p:animEffect>
+                                    <p:set>
+                                      <p:cBhvr>
+                                        <p:cTn id="146" dur="1" fill="hold">
+                                          <p:stCondLst>
+                                            <p:cond delay="499"/>
+                                          </p:stCondLst>
+                                        </p:cTn>
+                                        <p:tgtEl>
+                                          <p:spTgt spid="21"/>
+                                        </p:tgtEl>
+                                        <p:attrNameLst>
+                                          <p:attrName>style.visibility</p:attrName>
+                                        </p:attrNameLst>
+                                      </p:cBhvr>
+                                      <p:to>
+                                        <p:strVal val="hidden"/>
+                                      </p:to>
+                                    </p:set>
+                                  </p:childTnLst>
+                                </p:cTn>
+                              </p:par>
+                              <p:par>
+                                <p:cTn id="147" presetID="53" presetClass="exit" presetSubtype="32" fill="hold" nodeType="withEffect">
+                                  <p:stCondLst>
+                                    <p:cond delay="0"/>
+                                  </p:stCondLst>
+                                  <p:childTnLst>
+                                    <p:anim calcmode="lin" valueType="num">
+                                      <p:cBhvr>
+                                        <p:cTn id="148" dur="500"/>
+                                        <p:tgtEl>
+                                          <p:spTgt spid="22"/>
+                                        </p:tgtEl>
+                                        <p:attrNameLst>
+                                          <p:attrName>ppt_w</p:attrName>
+                                        </p:attrNameLst>
+                                      </p:cBhvr>
+                                      <p:tavLst>
+                                        <p:tav tm="0">
+                                          <p:val>
+                                            <p:strVal val="ppt_w"/>
+                                          </p:val>
+                                        </p:tav>
+                                        <p:tav tm="100000">
+                                          <p:val>
+                                            <p:fltVal val="0"/>
+                                          </p:val>
+                                        </p:tav>
+                                      </p:tavLst>
+                                    </p:anim>
+                                    <p:anim calcmode="lin" valueType="num">
+                                      <p:cBhvr>
+                                        <p:cTn id="149" dur="500"/>
+                                        <p:tgtEl>
+                                          <p:spTgt spid="22"/>
+                                        </p:tgtEl>
+                                        <p:attrNameLst>
+                                          <p:attrName>ppt_h</p:attrName>
+                                        </p:attrNameLst>
+                                      </p:cBhvr>
+                                      <p:tavLst>
+                                        <p:tav tm="0">
+                                          <p:val>
+                                            <p:strVal val="ppt_h"/>
+                                          </p:val>
+                                        </p:tav>
+                                        <p:tav tm="100000">
+                                          <p:val>
+                                            <p:fltVal val="0"/>
+                                          </p:val>
+                                        </p:tav>
+                                      </p:tavLst>
+                                    </p:anim>
+                                    <p:animEffect transition="out" filter="fade">
+                                      <p:cBhvr>
+                                        <p:cTn id="150" dur="500"/>
+                                        <p:tgtEl>
+                                          <p:spTgt spid="22"/>
+                                        </p:tgtEl>
+                                      </p:cBhvr>
+                                    </p:animEffect>
+                                    <p:set>
+                                      <p:cBhvr>
+                                        <p:cTn id="151" dur="1" fill="hold">
+                                          <p:stCondLst>
+                                            <p:cond delay="499"/>
+                                          </p:stCondLst>
+                                        </p:cTn>
+                                        <p:tgtEl>
+                                          <p:spTgt spid="22"/>
+                                        </p:tgtEl>
+                                        <p:attrNameLst>
+                                          <p:attrName>style.visibility</p:attrName>
+                                        </p:attrNameLst>
+                                      </p:cBhvr>
+                                      <p:to>
+                                        <p:strVal val="hidden"/>
+                                      </p:to>
+                                    </p:set>
+                                  </p:childTnLst>
+                                </p:cTn>
+                              </p:par>
+                              <p:par>
+                                <p:cTn id="152" presetID="53" presetClass="exit" presetSubtype="32" fill="hold" nodeType="withEffect">
+                                  <p:stCondLst>
+                                    <p:cond delay="0"/>
+                                  </p:stCondLst>
+                                  <p:childTnLst>
+                                    <p:anim calcmode="lin" valueType="num">
+                                      <p:cBhvr>
+                                        <p:cTn id="153" dur="500"/>
+                                        <p:tgtEl>
+                                          <p:spTgt spid="23"/>
+                                        </p:tgtEl>
+                                        <p:attrNameLst>
+                                          <p:attrName>ppt_w</p:attrName>
+                                        </p:attrNameLst>
+                                      </p:cBhvr>
+                                      <p:tavLst>
+                                        <p:tav tm="0">
+                                          <p:val>
+                                            <p:strVal val="ppt_w"/>
+                                          </p:val>
+                                        </p:tav>
+                                        <p:tav tm="100000">
+                                          <p:val>
+                                            <p:fltVal val="0"/>
+                                          </p:val>
+                                        </p:tav>
+                                      </p:tavLst>
+                                    </p:anim>
+                                    <p:anim calcmode="lin" valueType="num">
+                                      <p:cBhvr>
+                                        <p:cTn id="154" dur="500"/>
+                                        <p:tgtEl>
+                                          <p:spTgt spid="23"/>
+                                        </p:tgtEl>
+                                        <p:attrNameLst>
+                                          <p:attrName>ppt_h</p:attrName>
+                                        </p:attrNameLst>
+                                      </p:cBhvr>
+                                      <p:tavLst>
+                                        <p:tav tm="0">
+                                          <p:val>
+                                            <p:strVal val="ppt_h"/>
+                                          </p:val>
+                                        </p:tav>
+                                        <p:tav tm="100000">
+                                          <p:val>
+                                            <p:fltVal val="0"/>
+                                          </p:val>
+                                        </p:tav>
+                                      </p:tavLst>
+                                    </p:anim>
+                                    <p:animEffect transition="out" filter="fade">
+                                      <p:cBhvr>
+                                        <p:cTn id="155" dur="500"/>
+                                        <p:tgtEl>
+                                          <p:spTgt spid="23"/>
+                                        </p:tgtEl>
+                                      </p:cBhvr>
+                                    </p:animEffect>
+                                    <p:set>
+                                      <p:cBhvr>
+                                        <p:cTn id="156" dur="1" fill="hold">
+                                          <p:stCondLst>
+                                            <p:cond delay="499"/>
+                                          </p:stCondLst>
+                                        </p:cTn>
+                                        <p:tgtEl>
+                                          <p:spTgt spid="23"/>
+                                        </p:tgtEl>
+                                        <p:attrNameLst>
+                                          <p:attrName>style.visibility</p:attrName>
+                                        </p:attrNameLst>
+                                      </p:cBhvr>
+                                      <p:to>
+                                        <p:strVal val="hidden"/>
+                                      </p:to>
+                                    </p:set>
+                                  </p:childTnLst>
+                                </p:cTn>
+                              </p:par>
+                              <p:par>
+                                <p:cTn id="157" presetID="53" presetClass="exit" presetSubtype="32" fill="hold" nodeType="withEffect">
+                                  <p:stCondLst>
+                                    <p:cond delay="0"/>
+                                  </p:stCondLst>
+                                  <p:childTnLst>
+                                    <p:anim calcmode="lin" valueType="num">
+                                      <p:cBhvr>
+                                        <p:cTn id="158" dur="500"/>
+                                        <p:tgtEl>
+                                          <p:spTgt spid="24"/>
+                                        </p:tgtEl>
+                                        <p:attrNameLst>
+                                          <p:attrName>ppt_w</p:attrName>
+                                        </p:attrNameLst>
+                                      </p:cBhvr>
+                                      <p:tavLst>
+                                        <p:tav tm="0">
+                                          <p:val>
+                                            <p:strVal val="ppt_w"/>
+                                          </p:val>
+                                        </p:tav>
+                                        <p:tav tm="100000">
+                                          <p:val>
+                                            <p:fltVal val="0"/>
+                                          </p:val>
+                                        </p:tav>
+                                      </p:tavLst>
+                                    </p:anim>
+                                    <p:anim calcmode="lin" valueType="num">
+                                      <p:cBhvr>
+                                        <p:cTn id="159" dur="500"/>
+                                        <p:tgtEl>
+                                          <p:spTgt spid="24"/>
+                                        </p:tgtEl>
+                                        <p:attrNameLst>
+                                          <p:attrName>ppt_h</p:attrName>
+                                        </p:attrNameLst>
+                                      </p:cBhvr>
+                                      <p:tavLst>
+                                        <p:tav tm="0">
+                                          <p:val>
+                                            <p:strVal val="ppt_h"/>
+                                          </p:val>
+                                        </p:tav>
+                                        <p:tav tm="100000">
+                                          <p:val>
+                                            <p:fltVal val="0"/>
+                                          </p:val>
+                                        </p:tav>
+                                      </p:tavLst>
+                                    </p:anim>
+                                    <p:animEffect transition="out" filter="fade">
+                                      <p:cBhvr>
+                                        <p:cTn id="160" dur="500"/>
+                                        <p:tgtEl>
+                                          <p:spTgt spid="24"/>
+                                        </p:tgtEl>
+                                      </p:cBhvr>
+                                    </p:animEffect>
+                                    <p:set>
+                                      <p:cBhvr>
+                                        <p:cTn id="161" dur="1" fill="hold">
+                                          <p:stCondLst>
+                                            <p:cond delay="499"/>
+                                          </p:stCondLst>
+                                        </p:cTn>
+                                        <p:tgtEl>
+                                          <p:spTgt spid="24"/>
+                                        </p:tgtEl>
+                                        <p:attrNameLst>
+                                          <p:attrName>style.visibility</p:attrName>
+                                        </p:attrNameLst>
+                                      </p:cBhvr>
+                                      <p:to>
+                                        <p:strVal val="hidden"/>
+                                      </p:to>
+                                    </p:set>
+                                  </p:childTnLst>
+                                </p:cTn>
+                              </p:par>
+                            </p:childTnLst>
+                          </p:cTn>
+                        </p:par>
+                      </p:childTnLst>
+                    </p:cTn>
+                  </p:par>
+                </p:childTnLst>
+              </p:cTn>
+              <p:prevCondLst>
+                <p:cond evt="onPrev" delay="0">
+                  <p:tgtEl>
+                    <p:sldTgt/>
+                  </p:tgtEl>
+                </p:cond>
+              </p:prevCondLst>
+              <p:nextCondLst>
+                <p:cond evt="onNext" delay="0">
+                  <p:tgtEl>
+                    <p:sldTgt/>
+                  </p:tgtEl>
+                </p:cond>
+              </p:nextCondLst>
+            </p:seq>
+          </p:childTnLst>
+        </p:cTn>
+      </p:par>
+    </p:tnLst>
+    <p:bldLst>
+      <p:bldP spid="10" grpId="0" animBg="1"/>
+      <p:bldP spid="10" grpId="1" animBg="1"/>
+      <p:bldP spid="10" grpId="2" animBg="1"/>
+      <p:bldP spid="11" grpId="0"/>
+      <p:bldP spid="11" grpId="1"/>
+      <p:bldP spid="11" grpId="2"/>
     </p:bldLst>
   </p:timing>
 </p:sld>

</xml_diff>